<commit_message>
Modified HPC1 slides (both pptx and pdf versions) for Raijin course
</commit_message>
<xml_diff>
--- a/hpc1/01 Shell Primer - Slides.pptx
+++ b/hpc1/01 Shell Primer - Slides.pptx
@@ -219,6 +219,22 @@
       </a:defRPr>
     </a:lvl9pPr>
   </p:defaultTextStyle>
+  <p:extLst>
+    <p:ext uri="{EFAFB233-063F-42B5-8137-9DF3F51BA10A}">
+      <p15:sldGuideLst xmlns:p15="http://schemas.microsoft.com/office/powerpoint/2012/main">
+        <p15:guide id="1" orient="horz" pos="2160">
+          <p15:clr>
+            <a:srgbClr val="A4A3A4"/>
+          </p15:clr>
+        </p15:guide>
+        <p15:guide id="2" pos="2880">
+          <p15:clr>
+            <a:srgbClr val="A4A3A4"/>
+          </p15:clr>
+        </p15:guide>
+      </p15:sldGuideLst>
+    </p:ext>
+  </p:extLst>
 </p:presentation>
 </file>
 
@@ -305,7 +321,7 @@
             <a:fld id="{248BB486-BCA8-DD45-A489-59CF3E192B5B}" type="datetimeFigureOut">
               <a:rPr lang="en-US" smtClean="0"/>
               <a:pPr/>
-              <a:t>8/6/2013</a:t>
+              <a:t>4/13/17</a:t>
             </a:fld>
             <a:endParaRPr lang="en-US"/>
           </a:p>
@@ -696,6 +712,11 @@
         </p:txBody>
       </p:sp>
     </p:spTree>
+    <p:extLst>
+      <p:ext uri="{BB962C8B-B14F-4D97-AF65-F5344CB8AC3E}">
+        <p14:creationId xmlns:p14="http://schemas.microsoft.com/office/powerpoint/2010/main" val="483905801"/>
+      </p:ext>
+    </p:extLst>
   </p:cSld>
   <p:clrMapOvr>
     <a:masterClrMapping/>
@@ -833,37 +854,37 @@
           <a:lstStyle/>
           <a:p>
             <a:r>
-              <a:rPr lang="en-AU" smtClean="0"/>
+              <a:rPr lang="en-AU" dirty="0" smtClean="0"/>
               <a:t>Explain the difference between using a program (e.g. </a:t>
             </a:r>
             <a:r>
-              <a:rPr lang="en-AU" err="1" smtClean="0"/>
+              <a:rPr lang="en-AU" dirty="0" err="1" smtClean="0"/>
               <a:t>powerpoint</a:t>
             </a:r>
             <a:r>
-              <a:rPr lang="en-AU" smtClean="0"/>
+              <a:rPr lang="en-AU" dirty="0" smtClean="0"/>
               <a:t>) which has a huge set of commands</a:t>
             </a:r>
             <a:r>
-              <a:rPr lang="en-AU" baseline="0" smtClean="0"/>
+              <a:rPr lang="en-AU" baseline="0" dirty="0" smtClean="0"/>
               <a:t> in-built</a:t>
             </a:r>
           </a:p>
           <a:p>
-            <a:endParaRPr lang="en-AU" baseline="0" smtClean="0"/>
-          </a:p>
-          <a:p>
-            <a:r>
-              <a:rPr lang="en-AU" baseline="0" smtClean="0"/>
+            <a:endParaRPr lang="en-AU" baseline="0" dirty="0" smtClean="0"/>
+          </a:p>
+          <a:p>
+            <a:r>
+              <a:rPr lang="en-AU" baseline="0" dirty="0" smtClean="0"/>
               <a:t>versus</a:t>
             </a:r>
           </a:p>
           <a:p>
-            <a:endParaRPr lang="en-AU" baseline="0" smtClean="0"/>
-          </a:p>
-          <a:p>
-            <a:r>
-              <a:rPr lang="en-AU" baseline="0" smtClean="0"/>
+            <a:endParaRPr lang="en-AU" baseline="0" dirty="0" smtClean="0"/>
+          </a:p>
+          <a:p>
+            <a:r>
+              <a:rPr lang="en-AU" baseline="0" dirty="0" smtClean="0"/>
               <a:t>Running individual commands which all together can be very powerful</a:t>
             </a:r>
           </a:p>
@@ -989,6 +1010,11 @@
         </p:txBody>
       </p:sp>
     </p:spTree>
+    <p:extLst>
+      <p:ext uri="{BB962C8B-B14F-4D97-AF65-F5344CB8AC3E}">
+        <p14:creationId xmlns:p14="http://schemas.microsoft.com/office/powerpoint/2010/main" val="2132224727"/>
+      </p:ext>
+    </p:extLst>
   </p:cSld>
   <p:clrMapOvr>
     <a:masterClrMapping/>
@@ -1079,6 +1105,11 @@
         </p:txBody>
       </p:sp>
     </p:spTree>
+    <p:extLst>
+      <p:ext uri="{BB962C8B-B14F-4D97-AF65-F5344CB8AC3E}">
+        <p14:creationId xmlns:p14="http://schemas.microsoft.com/office/powerpoint/2010/main" val="1241369200"/>
+      </p:ext>
+    </p:extLst>
   </p:cSld>
   <p:clrMapOvr>
     <a:masterClrMapping/>
@@ -1161,6 +1192,11 @@
         </p:txBody>
       </p:sp>
     </p:spTree>
+    <p:extLst>
+      <p:ext uri="{BB962C8B-B14F-4D97-AF65-F5344CB8AC3E}">
+        <p14:creationId xmlns:p14="http://schemas.microsoft.com/office/powerpoint/2010/main" val="888513795"/>
+      </p:ext>
+    </p:extLst>
   </p:cSld>
   <p:clrMapOvr>
     <a:masterClrMapping/>
@@ -1247,6 +1283,11 @@
         </p:txBody>
       </p:sp>
     </p:spTree>
+    <p:extLst>
+      <p:ext uri="{BB962C8B-B14F-4D97-AF65-F5344CB8AC3E}">
+        <p14:creationId xmlns:p14="http://schemas.microsoft.com/office/powerpoint/2010/main" val="1797554974"/>
+      </p:ext>
+    </p:extLst>
   </p:cSld>
   <p:clrMapOvr>
     <a:masterClrMapping/>
@@ -1329,6 +1370,11 @@
         </p:txBody>
       </p:sp>
     </p:spTree>
+    <p:extLst>
+      <p:ext uri="{BB962C8B-B14F-4D97-AF65-F5344CB8AC3E}">
+        <p14:creationId xmlns:p14="http://schemas.microsoft.com/office/powerpoint/2010/main" val="283306451"/>
+      </p:ext>
+    </p:extLst>
   </p:cSld>
   <p:clrMapOvr>
     <a:masterClrMapping/>
@@ -1448,6 +1494,11 @@
         </p:txBody>
       </p:sp>
     </p:spTree>
+    <p:extLst>
+      <p:ext uri="{BB962C8B-B14F-4D97-AF65-F5344CB8AC3E}">
+        <p14:creationId xmlns:p14="http://schemas.microsoft.com/office/powerpoint/2010/main" val="560276558"/>
+      </p:ext>
+    </p:extLst>
   </p:cSld>
   <p:clrMapOvr>
     <a:masterClrMapping/>
@@ -1610,6 +1661,11 @@
         </p:txBody>
       </p:sp>
     </p:spTree>
+    <p:extLst>
+      <p:ext uri="{BB962C8B-B14F-4D97-AF65-F5344CB8AC3E}">
+        <p14:creationId xmlns:p14="http://schemas.microsoft.com/office/powerpoint/2010/main" val="1999801858"/>
+      </p:ext>
+    </p:extLst>
   </p:cSld>
   <p:clrMapOvr>
     <a:masterClrMapping/>
@@ -1715,6 +1771,11 @@
         </p:txBody>
       </p:sp>
     </p:spTree>
+    <p:extLst>
+      <p:ext uri="{BB962C8B-B14F-4D97-AF65-F5344CB8AC3E}">
+        <p14:creationId xmlns:p14="http://schemas.microsoft.com/office/powerpoint/2010/main" val="403268209"/>
+      </p:ext>
+    </p:extLst>
   </p:cSld>
   <p:clrMapOvr>
     <a:masterClrMapping/>
@@ -1834,6 +1895,7 @@
             <a:prstTxWarp prst="textNoShape">
               <a:avLst/>
             </a:prstTxWarp>
+            <a:normAutofit fontScale="92500" lnSpcReduction="20000"/>
           </a:bodyPr>
           <a:lstStyle/>
           <a:p>
@@ -2255,6 +2317,11 @@
         </p:txBody>
       </p:sp>
     </p:spTree>
+    <p:extLst>
+      <p:ext uri="{BB962C8B-B14F-4D97-AF65-F5344CB8AC3E}">
+        <p14:creationId xmlns:p14="http://schemas.microsoft.com/office/powerpoint/2010/main" val="484226218"/>
+      </p:ext>
+    </p:extLst>
   </p:cSld>
   <p:clrMapOvr>
     <a:masterClrMapping/>
@@ -2366,6 +2433,11 @@
         </p:txBody>
       </p:sp>
     </p:spTree>
+    <p:extLst>
+      <p:ext uri="{BB962C8B-B14F-4D97-AF65-F5344CB8AC3E}">
+        <p14:creationId xmlns:p14="http://schemas.microsoft.com/office/powerpoint/2010/main" val="270398731"/>
+      </p:ext>
+    </p:extLst>
   </p:cSld>
   <p:clrMapOvr>
     <a:masterClrMapping/>
@@ -2452,6 +2524,11 @@
         </p:txBody>
       </p:sp>
     </p:spTree>
+    <p:extLst>
+      <p:ext uri="{BB962C8B-B14F-4D97-AF65-F5344CB8AC3E}">
+        <p14:creationId xmlns:p14="http://schemas.microsoft.com/office/powerpoint/2010/main" val="516074865"/>
+      </p:ext>
+    </p:extLst>
   </p:cSld>
   <p:clrMapOvr>
     <a:masterClrMapping/>
@@ -2540,6 +2617,11 @@
         </p:txBody>
       </p:sp>
     </p:spTree>
+    <p:extLst>
+      <p:ext uri="{BB962C8B-B14F-4D97-AF65-F5344CB8AC3E}">
+        <p14:creationId xmlns:p14="http://schemas.microsoft.com/office/powerpoint/2010/main" val="2131289469"/>
+      </p:ext>
+    </p:extLst>
   </p:cSld>
   <p:clrMapOvr>
     <a:masterClrMapping/>
@@ -2622,6 +2704,11 @@
         </p:txBody>
       </p:sp>
     </p:spTree>
+    <p:extLst>
+      <p:ext uri="{BB962C8B-B14F-4D97-AF65-F5344CB8AC3E}">
+        <p14:creationId xmlns:p14="http://schemas.microsoft.com/office/powerpoint/2010/main" val="554873523"/>
+      </p:ext>
+    </p:extLst>
   </p:cSld>
   <p:clrMapOvr>
     <a:masterClrMapping/>
@@ -2733,6 +2820,11 @@
         </p:txBody>
       </p:sp>
     </p:spTree>
+    <p:extLst>
+      <p:ext uri="{BB962C8B-B14F-4D97-AF65-F5344CB8AC3E}">
+        <p14:creationId xmlns:p14="http://schemas.microsoft.com/office/powerpoint/2010/main" val="1385305787"/>
+      </p:ext>
+    </p:extLst>
   </p:cSld>
   <p:clrMapOvr>
     <a:masterClrMapping/>
@@ -2818,6 +2910,11 @@
         </p:txBody>
       </p:sp>
     </p:spTree>
+    <p:extLst>
+      <p:ext uri="{BB962C8B-B14F-4D97-AF65-F5344CB8AC3E}">
+        <p14:creationId xmlns:p14="http://schemas.microsoft.com/office/powerpoint/2010/main" val="2065595239"/>
+      </p:ext>
+    </p:extLst>
   </p:cSld>
   <p:clrMapOvr>
     <a:masterClrMapping/>
@@ -2900,6 +2997,11 @@
         </p:txBody>
       </p:sp>
     </p:spTree>
+    <p:extLst>
+      <p:ext uri="{BB962C8B-B14F-4D97-AF65-F5344CB8AC3E}">
+        <p14:creationId xmlns:p14="http://schemas.microsoft.com/office/powerpoint/2010/main" val="238544471"/>
+      </p:ext>
+    </p:extLst>
   </p:cSld>
   <p:clrMapOvr>
     <a:masterClrMapping/>
@@ -2988,6 +3090,11 @@
         </p:txBody>
       </p:sp>
     </p:spTree>
+    <p:extLst>
+      <p:ext uri="{BB962C8B-B14F-4D97-AF65-F5344CB8AC3E}">
+        <p14:creationId xmlns:p14="http://schemas.microsoft.com/office/powerpoint/2010/main" val="2012438795"/>
+      </p:ext>
+    </p:extLst>
   </p:cSld>
   <p:clrMapOvr>
     <a:masterClrMapping/>
@@ -3042,41 +3149,41 @@
           <a:lstStyle/>
           <a:p>
             <a:r>
-              <a:rPr lang="en-US" b="1" smtClean="0"/>
+              <a:rPr lang="en-US" b="1" dirty="0" smtClean="0"/>
               <a:t>[Keep asking the</a:t>
             </a:r>
             <a:r>
-              <a:rPr lang="en-US" b="1" baseline="0" smtClean="0"/>
+              <a:rPr lang="en-US" b="1" baseline="0" dirty="0" smtClean="0"/>
               <a:t> question and click three times.]</a:t>
             </a:r>
           </a:p>
           <a:p>
             <a:r>
-              <a:rPr lang="en-US" baseline="0" smtClean="0"/>
+              <a:rPr lang="en-US" baseline="0" dirty="0" smtClean="0"/>
               <a:t> - what is the answer to “what is inside ‘file one’?”</a:t>
             </a:r>
           </a:p>
           <a:p>
             <a:r>
-              <a:rPr lang="en-US" baseline="0" smtClean="0"/>
+              <a:rPr lang="en-US" baseline="0" dirty="0" smtClean="0"/>
               <a:t> - it depends on the answer to “what directory am I in?”</a:t>
             </a:r>
           </a:p>
           <a:p>
-            <a:endParaRPr lang="en-US" baseline="0" smtClean="0"/>
-          </a:p>
-          <a:p>
-            <a:r>
-              <a:rPr lang="en-US" b="1" baseline="0" smtClean="0"/>
+            <a:endParaRPr lang="en-US" baseline="0" dirty="0" smtClean="0"/>
+          </a:p>
+          <a:p>
+            <a:r>
+              <a:rPr lang="en-US" b="1" baseline="0" dirty="0" smtClean="0"/>
               <a:t>[Here is where we bring up absolute and relative paths.]</a:t>
             </a:r>
           </a:p>
           <a:p>
             <a:r>
-              <a:rPr lang="en-US" b="1" baseline="0" smtClean="0"/>
+              <a:rPr lang="en-US" b="1" baseline="0" dirty="0" smtClean="0"/>
               <a:t>[Make note of case sensitivity.] </a:t>
             </a:r>
-            <a:endParaRPr lang="en-US" b="1"/>
+            <a:endParaRPr lang="en-US" b="1" dirty="0"/>
           </a:p>
         </p:txBody>
       </p:sp>
@@ -3105,6 +3212,11 @@
         </p:txBody>
       </p:sp>
     </p:spTree>
+    <p:extLst>
+      <p:ext uri="{BB962C8B-B14F-4D97-AF65-F5344CB8AC3E}">
+        <p14:creationId xmlns:p14="http://schemas.microsoft.com/office/powerpoint/2010/main" val="191387315"/>
+      </p:ext>
+    </p:extLst>
   </p:cSld>
   <p:clrMapOvr>
     <a:masterClrMapping/>
@@ -3222,6 +3334,11 @@
         </p:txBody>
       </p:sp>
     </p:spTree>
+    <p:extLst>
+      <p:ext uri="{BB962C8B-B14F-4D97-AF65-F5344CB8AC3E}">
+        <p14:creationId xmlns:p14="http://schemas.microsoft.com/office/powerpoint/2010/main" val="1863583646"/>
+      </p:ext>
+    </p:extLst>
   </p:cSld>
   <p:clrMapOvr>
     <a:masterClrMapping/>
@@ -3349,6 +3466,11 @@
         </p:txBody>
       </p:sp>
     </p:spTree>
+    <p:extLst>
+      <p:ext uri="{BB962C8B-B14F-4D97-AF65-F5344CB8AC3E}">
+        <p14:creationId xmlns:p14="http://schemas.microsoft.com/office/powerpoint/2010/main" val="1574507443"/>
+      </p:ext>
+    </p:extLst>
   </p:cSld>
   <p:clrMapOvr>
     <a:masterClrMapping/>
@@ -3466,6 +3588,11 @@
         </p:txBody>
       </p:sp>
     </p:spTree>
+    <p:extLst>
+      <p:ext uri="{BB962C8B-B14F-4D97-AF65-F5344CB8AC3E}">
+        <p14:creationId xmlns:p14="http://schemas.microsoft.com/office/powerpoint/2010/main" val="201346827"/>
+      </p:ext>
+    </p:extLst>
   </p:cSld>
   <p:clrMapOvr>
     <a:masterClrMapping/>
@@ -3548,6 +3675,11 @@
         </p:txBody>
       </p:sp>
     </p:spTree>
+    <p:extLst>
+      <p:ext uri="{BB962C8B-B14F-4D97-AF65-F5344CB8AC3E}">
+        <p14:creationId xmlns:p14="http://schemas.microsoft.com/office/powerpoint/2010/main" val="1749377364"/>
+      </p:ext>
+    </p:extLst>
   </p:cSld>
   <p:clrMapOvr>
     <a:masterClrMapping/>
@@ -3653,6 +3785,11 @@
         </p:txBody>
       </p:sp>
     </p:spTree>
+    <p:extLst>
+      <p:ext uri="{BB962C8B-B14F-4D97-AF65-F5344CB8AC3E}">
+        <p14:creationId xmlns:p14="http://schemas.microsoft.com/office/powerpoint/2010/main" val="586745671"/>
+      </p:ext>
+    </p:extLst>
   </p:cSld>
   <p:clrMapOvr>
     <a:masterClrMapping/>
@@ -3739,6 +3876,11 @@
         </p:txBody>
       </p:sp>
     </p:spTree>
+    <p:extLst>
+      <p:ext uri="{BB962C8B-B14F-4D97-AF65-F5344CB8AC3E}">
+        <p14:creationId xmlns:p14="http://schemas.microsoft.com/office/powerpoint/2010/main" val="189585473"/>
+      </p:ext>
+    </p:extLst>
   </p:cSld>
   <p:clrMapOvr>
     <a:masterClrMapping/>
@@ -3821,6 +3963,11 @@
         </p:txBody>
       </p:sp>
     </p:spTree>
+    <p:extLst>
+      <p:ext uri="{BB962C8B-B14F-4D97-AF65-F5344CB8AC3E}">
+        <p14:creationId xmlns:p14="http://schemas.microsoft.com/office/powerpoint/2010/main" val="1644796210"/>
+      </p:ext>
+    </p:extLst>
   </p:cSld>
   <p:clrMapOvr>
     <a:masterClrMapping/>
@@ -3903,6 +4050,11 @@
         </p:txBody>
       </p:sp>
     </p:spTree>
+    <p:extLst>
+      <p:ext uri="{BB962C8B-B14F-4D97-AF65-F5344CB8AC3E}">
+        <p14:creationId xmlns:p14="http://schemas.microsoft.com/office/powerpoint/2010/main" val="1680397286"/>
+      </p:ext>
+    </p:extLst>
   </p:cSld>
   <p:clrMapOvr>
     <a:masterClrMapping/>
@@ -4011,6 +4163,11 @@
         </p:txBody>
       </p:sp>
     </p:spTree>
+    <p:extLst>
+      <p:ext uri="{BB962C8B-B14F-4D97-AF65-F5344CB8AC3E}">
+        <p14:creationId xmlns:p14="http://schemas.microsoft.com/office/powerpoint/2010/main" val="879744105"/>
+      </p:ext>
+    </p:extLst>
   </p:cSld>
   <p:clrMapOvr>
     <a:masterClrMapping/>
@@ -4116,6 +4273,11 @@
         </p:txBody>
       </p:sp>
     </p:spTree>
+    <p:extLst>
+      <p:ext uri="{BB962C8B-B14F-4D97-AF65-F5344CB8AC3E}">
+        <p14:creationId xmlns:p14="http://schemas.microsoft.com/office/powerpoint/2010/main" val="434263140"/>
+      </p:ext>
+    </p:extLst>
   </p:cSld>
   <p:clrMapOvr>
     <a:masterClrMapping/>
@@ -4206,6 +4368,11 @@
         </p:txBody>
       </p:sp>
     </p:spTree>
+    <p:extLst>
+      <p:ext uri="{BB962C8B-B14F-4D97-AF65-F5344CB8AC3E}">
+        <p14:creationId xmlns:p14="http://schemas.microsoft.com/office/powerpoint/2010/main" val="1511161474"/>
+      </p:ext>
+    </p:extLst>
   </p:cSld>
   <p:clrMapOvr>
     <a:masterClrMapping/>
@@ -4296,6 +4463,11 @@
         </p:txBody>
       </p:sp>
     </p:spTree>
+    <p:extLst>
+      <p:ext uri="{BB962C8B-B14F-4D97-AF65-F5344CB8AC3E}">
+        <p14:creationId xmlns:p14="http://schemas.microsoft.com/office/powerpoint/2010/main" val="1949284096"/>
+      </p:ext>
+    </p:extLst>
   </p:cSld>
   <p:clrMapOvr>
     <a:masterClrMapping/>
@@ -4431,6 +4603,11 @@
         </p:txBody>
       </p:sp>
     </p:spTree>
+    <p:extLst>
+      <p:ext uri="{BB962C8B-B14F-4D97-AF65-F5344CB8AC3E}">
+        <p14:creationId xmlns:p14="http://schemas.microsoft.com/office/powerpoint/2010/main" val="1453096167"/>
+      </p:ext>
+    </p:extLst>
   </p:cSld>
   <p:clrMapOvr>
     <a:masterClrMapping/>
@@ -4540,6 +4717,11 @@
         </p:txBody>
       </p:sp>
     </p:spTree>
+    <p:extLst>
+      <p:ext uri="{BB962C8B-B14F-4D97-AF65-F5344CB8AC3E}">
+        <p14:creationId xmlns:p14="http://schemas.microsoft.com/office/powerpoint/2010/main" val="1754766487"/>
+      </p:ext>
+    </p:extLst>
   </p:cSld>
   <p:clrMapOvr>
     <a:masterClrMapping/>
@@ -4622,6 +4804,11 @@
         </p:txBody>
       </p:sp>
     </p:spTree>
+    <p:extLst>
+      <p:ext uri="{BB962C8B-B14F-4D97-AF65-F5344CB8AC3E}">
+        <p14:creationId xmlns:p14="http://schemas.microsoft.com/office/powerpoint/2010/main" val="967422758"/>
+      </p:ext>
+    </p:extLst>
   </p:cSld>
   <p:clrMapOvr>
     <a:masterClrMapping/>
@@ -4716,6 +4903,11 @@
         </p:txBody>
       </p:sp>
     </p:spTree>
+    <p:extLst>
+      <p:ext uri="{BB962C8B-B14F-4D97-AF65-F5344CB8AC3E}">
+        <p14:creationId xmlns:p14="http://schemas.microsoft.com/office/powerpoint/2010/main" val="875602269"/>
+      </p:ext>
+    </p:extLst>
   </p:cSld>
   <p:clrMapOvr>
     <a:masterClrMapping/>
@@ -4806,6 +4998,11 @@
         </p:txBody>
       </p:sp>
     </p:spTree>
+    <p:extLst>
+      <p:ext uri="{BB962C8B-B14F-4D97-AF65-F5344CB8AC3E}">
+        <p14:creationId xmlns:p14="http://schemas.microsoft.com/office/powerpoint/2010/main" val="1689385839"/>
+      </p:ext>
+    </p:extLst>
   </p:cSld>
   <p:clrMapOvr>
     <a:masterClrMapping/>
@@ -4888,6 +5085,11 @@
         </p:txBody>
       </p:sp>
     </p:spTree>
+    <p:extLst>
+      <p:ext uri="{BB962C8B-B14F-4D97-AF65-F5344CB8AC3E}">
+        <p14:creationId xmlns:p14="http://schemas.microsoft.com/office/powerpoint/2010/main" val="1626499086"/>
+      </p:ext>
+    </p:extLst>
   </p:cSld>
   <p:clrMapOvr>
     <a:masterClrMapping/>
@@ -4970,6 +5172,11 @@
         </p:txBody>
       </p:sp>
     </p:spTree>
+    <p:extLst>
+      <p:ext uri="{BB962C8B-B14F-4D97-AF65-F5344CB8AC3E}">
+        <p14:creationId xmlns:p14="http://schemas.microsoft.com/office/powerpoint/2010/main" val="1250795739"/>
+      </p:ext>
+    </p:extLst>
   </p:cSld>
   <p:clrMapOvr>
     <a:masterClrMapping/>
@@ -5069,6 +5276,11 @@
         </p:txBody>
       </p:sp>
     </p:spTree>
+    <p:extLst>
+      <p:ext uri="{BB962C8B-B14F-4D97-AF65-F5344CB8AC3E}">
+        <p14:creationId xmlns:p14="http://schemas.microsoft.com/office/powerpoint/2010/main" val="406564890"/>
+      </p:ext>
+    </p:extLst>
   </p:cSld>
   <p:clrMapOvr>
     <a:masterClrMapping/>
@@ -5159,6 +5371,11 @@
         </p:txBody>
       </p:sp>
     </p:spTree>
+    <p:extLst>
+      <p:ext uri="{BB962C8B-B14F-4D97-AF65-F5344CB8AC3E}">
+        <p14:creationId xmlns:p14="http://schemas.microsoft.com/office/powerpoint/2010/main" val="1990625123"/>
+      </p:ext>
+    </p:extLst>
   </p:cSld>
   <p:clrMapOvr>
     <a:masterClrMapping/>
@@ -5241,6 +5458,11 @@
         </p:txBody>
       </p:sp>
     </p:spTree>
+    <p:extLst>
+      <p:ext uri="{BB962C8B-B14F-4D97-AF65-F5344CB8AC3E}">
+        <p14:creationId xmlns:p14="http://schemas.microsoft.com/office/powerpoint/2010/main" val="788705648"/>
+      </p:ext>
+    </p:extLst>
   </p:cSld>
   <p:clrMapOvr>
     <a:masterClrMapping/>
@@ -5323,6 +5545,11 @@
         </p:txBody>
       </p:sp>
     </p:spTree>
+    <p:extLst>
+      <p:ext uri="{BB962C8B-B14F-4D97-AF65-F5344CB8AC3E}">
+        <p14:creationId xmlns:p14="http://schemas.microsoft.com/office/powerpoint/2010/main" val="1506756652"/>
+      </p:ext>
+    </p:extLst>
   </p:cSld>
   <p:clrMapOvr>
     <a:masterClrMapping/>
@@ -5426,6 +5653,11 @@
         </p:txBody>
       </p:sp>
     </p:spTree>
+    <p:extLst>
+      <p:ext uri="{BB962C8B-B14F-4D97-AF65-F5344CB8AC3E}">
+        <p14:creationId xmlns:p14="http://schemas.microsoft.com/office/powerpoint/2010/main" val="1003245085"/>
+      </p:ext>
+    </p:extLst>
   </p:cSld>
   <p:clrMapOvr>
     <a:masterClrMapping/>
@@ -5534,6 +5766,11 @@
         </p:txBody>
       </p:sp>
     </p:spTree>
+    <p:extLst>
+      <p:ext uri="{BB962C8B-B14F-4D97-AF65-F5344CB8AC3E}">
+        <p14:creationId xmlns:p14="http://schemas.microsoft.com/office/powerpoint/2010/main" val="931884740"/>
+      </p:ext>
+    </p:extLst>
   </p:cSld>
   <p:clrMapOvr>
     <a:masterClrMapping/>
@@ -5640,6 +5877,11 @@
         </p:txBody>
       </p:sp>
     </p:spTree>
+    <p:extLst>
+      <p:ext uri="{BB962C8B-B14F-4D97-AF65-F5344CB8AC3E}">
+        <p14:creationId xmlns:p14="http://schemas.microsoft.com/office/powerpoint/2010/main" val="588587609"/>
+      </p:ext>
+    </p:extLst>
   </p:cSld>
   <p:clrMapOvr>
     <a:masterClrMapping/>
@@ -5726,6 +5968,11 @@
         </p:txBody>
       </p:sp>
     </p:spTree>
+    <p:extLst>
+      <p:ext uri="{BB962C8B-B14F-4D97-AF65-F5344CB8AC3E}">
+        <p14:creationId xmlns:p14="http://schemas.microsoft.com/office/powerpoint/2010/main" val="1082266381"/>
+      </p:ext>
+    </p:extLst>
   </p:cSld>
   <p:clrMapOvr>
     <a:masterClrMapping/>
@@ -5812,6 +6059,11 @@
         </p:txBody>
       </p:sp>
     </p:spTree>
+    <p:extLst>
+      <p:ext uri="{BB962C8B-B14F-4D97-AF65-F5344CB8AC3E}">
+        <p14:creationId xmlns:p14="http://schemas.microsoft.com/office/powerpoint/2010/main" val="464575377"/>
+      </p:ext>
+    </p:extLst>
   </p:cSld>
   <p:clrMapOvr>
     <a:masterClrMapping/>
@@ -5894,6 +6146,11 @@
         </p:txBody>
       </p:sp>
     </p:spTree>
+    <p:extLst>
+      <p:ext uri="{BB962C8B-B14F-4D97-AF65-F5344CB8AC3E}">
+        <p14:creationId xmlns:p14="http://schemas.microsoft.com/office/powerpoint/2010/main" val="2015304394"/>
+      </p:ext>
+    </p:extLst>
   </p:cSld>
   <p:clrMapOvr>
     <a:masterClrMapping/>
@@ -5984,6 +6241,11 @@
         </p:txBody>
       </p:sp>
     </p:spTree>
+    <p:extLst>
+      <p:ext uri="{BB962C8B-B14F-4D97-AF65-F5344CB8AC3E}">
+        <p14:creationId xmlns:p14="http://schemas.microsoft.com/office/powerpoint/2010/main" val="1108869474"/>
+      </p:ext>
+    </p:extLst>
   </p:cSld>
   <p:clrMapOvr>
     <a:masterClrMapping/>
@@ -6066,6 +6328,11 @@
         </p:txBody>
       </p:sp>
     </p:spTree>
+    <p:extLst>
+      <p:ext uri="{BB962C8B-B14F-4D97-AF65-F5344CB8AC3E}">
+        <p14:creationId xmlns:p14="http://schemas.microsoft.com/office/powerpoint/2010/main" val="906160852"/>
+      </p:ext>
+    </p:extLst>
   </p:cSld>
   <p:clrMapOvr>
     <a:masterClrMapping/>
@@ -6158,6 +6425,11 @@
         </p:txBody>
       </p:sp>
     </p:spTree>
+    <p:extLst>
+      <p:ext uri="{BB962C8B-B14F-4D97-AF65-F5344CB8AC3E}">
+        <p14:creationId xmlns:p14="http://schemas.microsoft.com/office/powerpoint/2010/main" val="1646030998"/>
+      </p:ext>
+    </p:extLst>
   </p:cSld>
   <p:clrMapOvr>
     <a:masterClrMapping/>
@@ -6317,6 +6589,11 @@
         </p:txBody>
       </p:sp>
     </p:spTree>
+    <p:extLst>
+      <p:ext uri="{BB962C8B-B14F-4D97-AF65-F5344CB8AC3E}">
+        <p14:creationId xmlns:p14="http://schemas.microsoft.com/office/powerpoint/2010/main" val="958642732"/>
+      </p:ext>
+    </p:extLst>
   </p:cSld>
   <p:clrMapOvr>
     <a:masterClrMapping/>
@@ -6371,20 +6648,20 @@
           <a:lstStyle/>
           <a:p>
             <a:r>
-              <a:rPr lang="en-US" smtClean="0"/>
+              <a:rPr lang="en-US" dirty="0" smtClean="0"/>
               <a:t>This</a:t>
             </a:r>
             <a:r>
-              <a:rPr lang="en-US" baseline="0" smtClean="0"/>
+              <a:rPr lang="en-US" baseline="0" dirty="0" smtClean="0"/>
               <a:t> is a picture of what shells look like for me.</a:t>
             </a:r>
           </a:p>
           <a:p>
-            <a:endParaRPr lang="en-US" baseline="0" smtClean="0"/>
-          </a:p>
-          <a:p>
-            <a:r>
-              <a:rPr lang="en-US" b="1" baseline="0" smtClean="0"/>
+            <a:endParaRPr lang="en-US" baseline="0" dirty="0" smtClean="0"/>
+          </a:p>
+          <a:p>
+            <a:r>
+              <a:rPr lang="en-US" b="1" baseline="0" dirty="0" smtClean="0"/>
               <a:t>[Point out]</a:t>
             </a:r>
           </a:p>
@@ -6394,7 +6671,7 @@
               <a:buChar char="•"/>
             </a:pPr>
             <a:r>
-              <a:rPr lang="en-US" baseline="0" smtClean="0"/>
+              <a:rPr lang="en-US" baseline="0" dirty="0" smtClean="0"/>
               <a:t> the shell runs inside a window called a ‘terminal’</a:t>
             </a:r>
           </a:p>
@@ -6404,7 +6681,7 @@
               <a:buChar char="•"/>
             </a:pPr>
             <a:r>
-              <a:rPr lang="en-US" baseline="0" smtClean="0"/>
+              <a:rPr lang="en-US" baseline="0" dirty="0" smtClean="0"/>
               <a:t> the shell has a prompt that is waiting for your input</a:t>
             </a:r>
           </a:p>
@@ -6414,12 +6691,12 @@
               <a:buChar char="•"/>
             </a:pPr>
             <a:r>
-              <a:rPr lang="en-US" baseline="0" smtClean="0"/>
+              <a:rPr lang="en-US" baseline="0" dirty="0" smtClean="0"/>
               <a:t> The prompt can vary – I use it to keep track of where I am (more on this later)</a:t>
             </a:r>
           </a:p>
           <a:p>
-            <a:endParaRPr lang="en-US" baseline="0" smtClean="0"/>
+            <a:endParaRPr lang="en-US" baseline="0" dirty="0" smtClean="0"/>
           </a:p>
         </p:txBody>
       </p:sp>
@@ -6448,6 +6725,11 @@
         </p:txBody>
       </p:sp>
     </p:spTree>
+    <p:extLst>
+      <p:ext uri="{BB962C8B-B14F-4D97-AF65-F5344CB8AC3E}">
+        <p14:creationId xmlns:p14="http://schemas.microsoft.com/office/powerpoint/2010/main" val="1486076930"/>
+      </p:ext>
+    </p:extLst>
   </p:cSld>
   <p:clrMapOvr>
     <a:masterClrMapping/>
@@ -6556,6 +6838,11 @@
         </p:txBody>
       </p:sp>
     </p:spTree>
+    <p:extLst>
+      <p:ext uri="{BB962C8B-B14F-4D97-AF65-F5344CB8AC3E}">
+        <p14:creationId xmlns:p14="http://schemas.microsoft.com/office/powerpoint/2010/main" val="1260147900"/>
+      </p:ext>
+    </p:extLst>
   </p:cSld>
   <p:clrMapOvr>
     <a:masterClrMapping/>
@@ -9347,10 +9634,13 @@
                 <a:ea typeface="Tahoma" charset="0"/>
                 <a:cs typeface="Tahoma" charset="0"/>
               </a:rPr>
-              <a:t>Introduction to </a:t>
-            </a:r>
-            <a:r>
-              <a:rPr lang="en-US" smtClean="0">
+              <a:t>Introduction to Unix for HPC</a:t>
+            </a:r>
+          </a:p>
+          <a:p>
+            <a:pPr eaLnBrk="1" hangingPunct="1"/>
+            <a:r>
+              <a:rPr lang="en-US" dirty="0" smtClean="0">
                 <a:solidFill>
                   <a:srgbClr val="7F7F7F"/>
                 </a:solidFill>
@@ -9358,7 +9648,7 @@
                 <a:ea typeface="Tahoma" charset="0"/>
                 <a:cs typeface="Tahoma" charset="0"/>
               </a:rPr>
-              <a:t>Unix for HPC</a:t>
+              <a:t>Raijin version</a:t>
             </a:r>
             <a:endParaRPr lang="en-US" dirty="0" smtClean="0">
               <a:solidFill>
@@ -9368,6 +9658,32 @@
               <a:ea typeface="Tahoma" charset="0"/>
               <a:cs typeface="Tahoma" charset="0"/>
             </a:endParaRPr>
+          </a:p>
+        </p:txBody>
+      </p:sp>
+      <p:sp>
+        <p:nvSpPr>
+          <p:cNvPr id="2" name="TextBox 1"/>
+          <p:cNvSpPr txBox="1"/>
+          <p:nvPr/>
+        </p:nvSpPr>
+        <p:spPr>
+          <a:xfrm>
+            <a:off x="3635375" y="4841875"/>
+            <a:ext cx="184666" cy="369332"/>
+          </a:xfrm>
+          <a:prstGeom prst="rect">
+            <a:avLst/>
+          </a:prstGeom>
+          <a:noFill/>
+        </p:spPr>
+        <p:txBody>
+          <a:bodyPr wrap="none" rtlCol="0">
+            <a:spAutoFit/>
+          </a:bodyPr>
+          <a:lstStyle/>
+          <a:p>
+            <a:endParaRPr lang="en-US" dirty="0"/>
           </a:p>
         </p:txBody>
       </p:sp>
@@ -9471,18 +9787,7 @@
                 <a:ea typeface="Tahoma" charset="0"/>
                 <a:cs typeface="Tahoma" charset="0"/>
               </a:rPr>
-              <a:t>Unix </a:t>
-            </a:r>
-            <a:r>
-              <a:rPr lang="en-US" smtClean="0">
-                <a:solidFill>
-                  <a:srgbClr val="7F7F7F"/>
-                </a:solidFill>
-                <a:latin typeface="Tahoma" charset="0"/>
-                <a:ea typeface="Tahoma" charset="0"/>
-                <a:cs typeface="Tahoma" charset="0"/>
-              </a:rPr>
-              <a:t>for HPC</a:t>
+              <a:t>Unix for HPC</a:t>
             </a:r>
             <a:endParaRPr lang="en-US" dirty="0" smtClean="0">
               <a:solidFill>
@@ -9706,61 +10011,65 @@
           <a:lstStyle/>
           <a:p>
             <a:r>
-              <a:rPr lang="en-AU" smtClean="0"/>
+              <a:rPr lang="en-AU" dirty="0" smtClean="0"/>
               <a:t>UNIX was initially developed by AT&amp;T employees at Bell Labs in 1969 </a:t>
             </a:r>
           </a:p>
           <a:p>
             <a:r>
-              <a:rPr lang="en-AU" smtClean="0"/>
+              <a:rPr lang="en-AU" dirty="0" smtClean="0"/>
               <a:t>Common Variants today: Linux, </a:t>
             </a:r>
             <a:r>
-              <a:rPr lang="en-AU" err="1" smtClean="0"/>
+              <a:rPr lang="en-AU" dirty="0" err="1" smtClean="0"/>
               <a:t>OpenSolaris</a:t>
             </a:r>
             <a:r>
-              <a:rPr lang="en-AU" smtClean="0"/>
+              <a:rPr lang="en-AU" dirty="0" smtClean="0"/>
               <a:t>, </a:t>
             </a:r>
             <a:r>
-              <a:rPr lang="en-AU"/>
+              <a:rPr lang="en-AU" dirty="0"/>
               <a:t>FreeBSD, </a:t>
             </a:r>
             <a:r>
-              <a:rPr lang="en-AU" smtClean="0"/>
+              <a:rPr lang="en-AU" dirty="0" smtClean="0"/>
               <a:t>HP/UX, AIX</a:t>
             </a:r>
           </a:p>
           <a:p>
             <a:r>
-              <a:rPr lang="en-AU" smtClean="0"/>
+              <a:rPr lang="en-AU" dirty="0" smtClean="0"/>
               <a:t>100’s of Major Linux Distributions: </a:t>
             </a:r>
             <a:r>
-              <a:rPr lang="en-AU" err="1" smtClean="0"/>
+              <a:rPr lang="en-AU" dirty="0" err="1" smtClean="0"/>
               <a:t>Debian</a:t>
             </a:r>
             <a:r>
-              <a:rPr lang="en-AU" smtClean="0"/>
+              <a:rPr lang="en-AU" dirty="0" smtClean="0"/>
               <a:t>-based (e.g. Ubuntu</a:t>
             </a:r>
             <a:r>
-              <a:rPr lang="en-AU"/>
+              <a:rPr lang="en-AU" dirty="0"/>
               <a:t>), Red Hat Package Manager </a:t>
             </a:r>
             <a:r>
-              <a:rPr lang="en-AU" smtClean="0"/>
+              <a:rPr lang="en-AU" dirty="0" smtClean="0"/>
               <a:t>(RPM)-based (SUSE, Red Hat &amp; Fedora)</a:t>
             </a:r>
           </a:p>
           <a:p>
             <a:pPr algn="ctr"/>
             <a:r>
-              <a:rPr lang="en-AU" b="1" smtClean="0"/>
-              <a:t>Octane uses SUSE LINUX</a:t>
-            </a:r>
-            <a:endParaRPr lang="en-AU" b="1"/>
+              <a:rPr lang="en-AU" b="1" dirty="0" err="1" smtClean="0"/>
+              <a:t>Rajin</a:t>
+            </a:r>
+            <a:r>
+              <a:rPr lang="en-AU" b="1" dirty="0" smtClean="0"/>
+              <a:t> uses CentOS</a:t>
+            </a:r>
+            <a:endParaRPr lang="en-AU" b="1" dirty="0"/>
           </a:p>
         </p:txBody>
       </p:sp>
@@ -10006,9 +10315,40 @@
           <a:chExt cx="0" cy="0"/>
         </a:xfrm>
       </p:grpSpPr>
+      <p:sp>
+        <p:nvSpPr>
+          <p:cNvPr id="3" name="Slide Number Placeholder 2"/>
+          <p:cNvSpPr>
+            <a:spLocks noGrp="1"/>
+          </p:cNvSpPr>
+          <p:nvPr>
+            <p:ph type="sldNum" sz="quarter" idx="11"/>
+          </p:nvPr>
+        </p:nvSpPr>
+        <p:spPr/>
+        <p:txBody>
+          <a:bodyPr/>
+          <a:lstStyle/>
+          <a:p>
+            <a:endParaRPr lang="en-AU" smtClean="0"/>
+          </a:p>
+          <a:p>
+            <a:r>
+              <a:rPr lang="en-AU" smtClean="0"/>
+              <a:t>Slide </a:t>
+            </a:r>
+            <a:fld id="{E379F0B1-8FC1-49B0-9B43-A01487FA5057}" type="slidenum">
+              <a:rPr lang="en-AU" smtClean="0"/>
+              <a:pPr/>
+              <a:t>14</a:t>
+            </a:fld>
+            <a:endParaRPr lang="en-AU" dirty="0"/>
+          </a:p>
+        </p:txBody>
+      </p:sp>
       <p:pic>
         <p:nvPicPr>
-          <p:cNvPr id="5" name="Picture 4"/>
+          <p:cNvPr id="4" name="Picture 3"/>
           <p:cNvPicPr>
             <a:picLocks noChangeAspect="1"/>
           </p:cNvPicPr>
@@ -10022,45 +10362,14 @@
         </p:blipFill>
         <p:spPr>
           <a:xfrm>
-            <a:off x="2209800" y="609600"/>
-            <a:ext cx="5230678" cy="5486400"/>
+            <a:off x="1079612" y="278661"/>
+            <a:ext cx="6264696" cy="6232734"/>
           </a:xfrm>
           <a:prstGeom prst="rect">
             <a:avLst/>
           </a:prstGeom>
         </p:spPr>
       </p:pic>
-      <p:sp>
-        <p:nvSpPr>
-          <p:cNvPr id="3" name="Slide Number Placeholder 2"/>
-          <p:cNvSpPr>
-            <a:spLocks noGrp="1"/>
-          </p:cNvSpPr>
-          <p:nvPr>
-            <p:ph type="sldNum" sz="quarter" idx="11"/>
-          </p:nvPr>
-        </p:nvSpPr>
-        <p:spPr/>
-        <p:txBody>
-          <a:bodyPr/>
-          <a:lstStyle/>
-          <a:p>
-            <a:endParaRPr lang="en-AU" smtClean="0"/>
-          </a:p>
-          <a:p>
-            <a:r>
-              <a:rPr lang="en-AU" smtClean="0"/>
-              <a:t>Slide </a:t>
-            </a:r>
-            <a:fld id="{E379F0B1-8FC1-49B0-9B43-A01487FA5057}" type="slidenum">
-              <a:rPr lang="en-AU" smtClean="0"/>
-              <a:pPr/>
-              <a:t>14</a:t>
-            </a:fld>
-            <a:endParaRPr lang="en-AU" dirty="0"/>
-          </a:p>
-        </p:txBody>
-      </p:sp>
     </p:spTree>
   </p:cSld>
   <p:clrMapOvr>
@@ -10543,7 +10852,7 @@
           <a:lstStyle/>
           <a:p>
             <a:r>
-              <a:rPr lang="en-US" sz="2000" smtClean="0">
+              <a:rPr lang="en-US" sz="2000" dirty="0" smtClean="0">
                 <a:solidFill>
                   <a:srgbClr val="FF0000"/>
                 </a:solidFill>
@@ -10553,64 +10862,94 @@
               <a:t>	</a:t>
             </a:r>
             <a:r>
-              <a:rPr lang="en-US"/>
+              <a:rPr lang="en-US" dirty="0"/>
               <a:t>Commands comprise of:</a:t>
             </a:r>
           </a:p>
           <a:p>
             <a:pPr lvl="1"/>
             <a:r>
-              <a:rPr lang="en-US"/>
+              <a:rPr lang="en-US" dirty="0"/>
               <a:t>a </a:t>
             </a:r>
             <a:r>
-              <a:rPr lang="en-US" b="1" smtClean="0"/>
+              <a:rPr lang="en-US" b="1" dirty="0" smtClean="0"/>
               <a:t>command</a:t>
             </a:r>
             <a:r>
-              <a:rPr lang="en-US" smtClean="0"/>
+              <a:rPr lang="en-US" dirty="0" smtClean="0"/>
               <a:t> that invokes a program</a:t>
             </a:r>
-            <a:endParaRPr lang="en-US"/>
+            <a:endParaRPr lang="en-US" dirty="0"/>
           </a:p>
           <a:p>
             <a:pPr lvl="1"/>
             <a:r>
-              <a:rPr lang="en-US" b="1" smtClean="0"/>
+              <a:rPr lang="en-US" b="1" dirty="0" smtClean="0"/>
               <a:t>arguments</a:t>
             </a:r>
             <a:r>
-              <a:rPr lang="en-US" smtClean="0"/>
+              <a:rPr lang="en-US" dirty="0" smtClean="0"/>
               <a:t> to that program</a:t>
             </a:r>
           </a:p>
           <a:p>
             <a:pPr lvl="1"/>
-            <a:endParaRPr lang="en-US"/>
+            <a:endParaRPr lang="en-US" dirty="0"/>
           </a:p>
           <a:p>
             <a:pPr>
               <a:buNone/>
             </a:pPr>
             <a:r>
-              <a:rPr lang="en-US" sz="2000" b="1" smtClean="0">
+              <a:rPr lang="en-US" sz="2000" b="1" dirty="0" smtClean="0">
                 <a:solidFill>
                   <a:srgbClr val="FF0000"/>
                 </a:solidFill>
                 <a:latin typeface="Courier New"/>
                 <a:cs typeface="Courier New"/>
               </a:rPr>
-              <a:t>hpc85@octaneorange:~&gt;</a:t>
-            </a:r>
-            <a:r>
-              <a:rPr lang="en-US" sz="2000" b="1" smtClean="0">
+              <a:t>   </a:t>
+            </a:r>
+            <a:r>
+              <a:rPr lang="en-US" sz="2000" b="1" dirty="0" smtClean="0">
+                <a:solidFill>
+                  <a:srgbClr val="FF0000"/>
+                </a:solidFill>
+                <a:latin typeface="Courier New"/>
+                <a:cs typeface="Courier New"/>
+              </a:rPr>
+              <a:t> [user4@raijin</a:t>
+            </a:r>
+            <a:r>
+              <a:rPr lang="en-US" sz="2000" b="1" dirty="0">
+                <a:solidFill>
+                  <a:srgbClr val="FF0000"/>
+                </a:solidFill>
                 <a:latin typeface="Courier New"/>
                 <a:cs typeface="Courier New"/>
               </a:rPr>
               <a:t> </a:t>
             </a:r>
             <a:r>
-              <a:rPr lang="en-US" sz="2000" b="1" err="1" smtClean="0">
+              <a:rPr lang="en-US" sz="2000" b="1" dirty="0" smtClean="0">
+                <a:solidFill>
+                  <a:srgbClr val="FF0000"/>
+                </a:solidFill>
+                <a:latin typeface="Courier New"/>
+                <a:cs typeface="Courier New"/>
+              </a:rPr>
+              <a:t>~]$</a:t>
+            </a:r>
+            <a:r>
+              <a:rPr lang="en-US" sz="2000" b="1" dirty="0" smtClean="0">
+                <a:latin typeface="Courier New"/>
+                <a:cs typeface="Courier New"/>
+              </a:rPr>
+              <a:t> </a:t>
+            </a:r>
+            <a:r>
+              <a:rPr lang="en-US" sz="2000" b="1" dirty="0" err="1" smtClean="0">
                 <a:solidFill>
                   <a:srgbClr val="008000"/>
                 </a:solidFill>
@@ -10620,7 +10959,7 @@
               <a:t>cmd</a:t>
             </a:r>
             <a:r>
-              <a:rPr lang="en-US" sz="2000" b="1" smtClean="0">
+              <a:rPr lang="en-US" sz="2000" b="1" dirty="0" smtClean="0">
                 <a:solidFill>
                   <a:srgbClr val="008000"/>
                 </a:solidFill>
@@ -10630,7 +10969,7 @@
               <a:t> </a:t>
             </a:r>
             <a:r>
-              <a:rPr lang="en-US" sz="2000" b="1" smtClean="0">
+              <a:rPr lang="en-US" sz="2000" b="1" dirty="0" smtClean="0">
                 <a:latin typeface="Courier New"/>
                 <a:cs typeface="Courier New"/>
               </a:rPr>
@@ -10641,7 +10980,7 @@
             <a:pPr>
               <a:buNone/>
             </a:pPr>
-            <a:endParaRPr lang="en-US" sz="2000" smtClean="0">
+            <a:endParaRPr lang="en-US" sz="2000" dirty="0" smtClean="0">
               <a:solidFill>
                 <a:srgbClr val="FF0000"/>
               </a:solidFill>
@@ -10653,7 +10992,7 @@
             <a:pPr>
               <a:buNone/>
             </a:pPr>
-            <a:endParaRPr lang="en-US" sz="2000" smtClean="0">
+            <a:endParaRPr lang="en-US" sz="2000" dirty="0" smtClean="0">
               <a:solidFill>
                 <a:srgbClr val="FF0000"/>
               </a:solidFill>
@@ -10665,7 +11004,7 @@
             <a:pPr>
               <a:buNone/>
             </a:pPr>
-            <a:endParaRPr lang="en-US" sz="2000" smtClean="0">
+            <a:endParaRPr lang="en-US" sz="2000" dirty="0" smtClean="0">
               <a:solidFill>
                 <a:srgbClr val="FF0000"/>
               </a:solidFill>
@@ -10678,44 +11017,54 @@
               <a:buNone/>
             </a:pPr>
             <a:r>
-              <a:rPr lang="en-US" sz="2000" b="1">
+              <a:rPr lang="en-US" sz="2000" b="1" dirty="0" smtClean="0">
                 <a:solidFill>
                   <a:srgbClr val="FF0000"/>
                 </a:solidFill>
                 <a:latin typeface="Courier New"/>
                 <a:cs typeface="Courier New"/>
               </a:rPr>
-              <a:t>hpc85</a:t>
-            </a:r>
-            <a:r>
-              <a:rPr lang="en-US" sz="2000" b="1" smtClean="0">
+              <a:t> </a:t>
+            </a:r>
+            <a:r>
+              <a:rPr lang="en-US" sz="2000" b="1" dirty="0" smtClean="0">
                 <a:solidFill>
                   <a:srgbClr val="FF0000"/>
                 </a:solidFill>
                 <a:latin typeface="Courier New"/>
                 <a:cs typeface="Courier New"/>
               </a:rPr>
-              <a:t>@octaneorange</a:t>
-            </a:r>
-            <a:r>
-              <a:rPr lang="en-US" sz="2000" b="1">
+              <a:t>   </a:t>
+            </a:r>
+            <a:r>
+              <a:rPr lang="en-US" sz="2000" b="1" dirty="0" smtClean="0">
                 <a:solidFill>
                   <a:srgbClr val="FF0000"/>
                 </a:solidFill>
                 <a:latin typeface="Courier New"/>
                 <a:cs typeface="Courier New"/>
               </a:rPr>
-              <a:t>:~&gt;</a:t>
-            </a:r>
-            <a:r>
-              <a:rPr lang="en-US" sz="2000" b="1" smtClean="0">
+              <a:t>[</a:t>
+            </a:r>
+            <a:r>
+              <a:rPr lang="en-US" sz="2000" b="1" dirty="0">
+                <a:solidFill>
+                  <a:srgbClr val="FF0000"/>
+                </a:solidFill>
+                <a:latin typeface="Courier New"/>
+                <a:cs typeface="Courier New"/>
+              </a:rPr>
+              <a:t>user4@raijin ~]$</a:t>
+            </a:r>
+            <a:r>
+              <a:rPr lang="en-US" sz="2000" b="1" dirty="0" smtClean="0">
                 <a:latin typeface="Courier New"/>
                 <a:cs typeface="Courier New"/>
               </a:rPr>
               <a:t> </a:t>
             </a:r>
             <a:r>
-              <a:rPr lang="en-US" sz="2000" b="1" err="1" smtClean="0">
+              <a:rPr lang="en-US" sz="2000" b="1" dirty="0" err="1" smtClean="0">
                 <a:solidFill>
                   <a:srgbClr val="008000"/>
                 </a:solidFill>
@@ -10725,7 +11074,7 @@
               <a:t>cmd</a:t>
             </a:r>
             <a:r>
-              <a:rPr lang="en-US" sz="2000" b="1" smtClean="0">
+              <a:rPr lang="en-US" sz="2000" b="1" dirty="0" smtClean="0">
                 <a:solidFill>
                   <a:srgbClr val="008000"/>
                 </a:solidFill>
@@ -10735,41 +11084,41 @@
               <a:t> </a:t>
             </a:r>
             <a:r>
-              <a:rPr lang="en-US" sz="2000" b="1" smtClean="0">
+              <a:rPr lang="en-US" sz="2000" b="1" dirty="0" smtClean="0">
                 <a:latin typeface="Courier New"/>
                 <a:cs typeface="Courier New"/>
               </a:rPr>
               <a:t>arg1 arg2 arg3</a:t>
             </a:r>
             <a:r>
-              <a:rPr lang="en-US" sz="2000" b="1">
+              <a:rPr lang="en-US" sz="2000" b="1" dirty="0">
                 <a:latin typeface="Courier New"/>
                 <a:cs typeface="Courier New"/>
               </a:rPr>
               <a:t> </a:t>
             </a:r>
             <a:r>
-              <a:rPr lang="en-US" sz="2000" b="1" smtClean="0">
+              <a:rPr lang="en-US" sz="2000" b="1" dirty="0" smtClean="0">
                 <a:latin typeface="Courier New"/>
                 <a:cs typeface="Courier New"/>
               </a:rPr>
               <a:t>“</a:t>
             </a:r>
             <a:r>
-              <a:rPr lang="en-US" sz="2000" b="1" err="1" smtClean="0">
+              <a:rPr lang="en-US" sz="2000" b="1" dirty="0" err="1" smtClean="0">
                 <a:latin typeface="Courier New"/>
                 <a:cs typeface="Courier New"/>
               </a:rPr>
               <a:t>arg</a:t>
             </a:r>
             <a:r>
-              <a:rPr lang="en-US" sz="2000" b="1" smtClean="0">
+              <a:rPr lang="en-US" sz="2000" b="1" dirty="0" smtClean="0">
                 <a:latin typeface="Courier New"/>
                 <a:cs typeface="Courier New"/>
               </a:rPr>
               <a:t> 4”</a:t>
             </a:r>
-            <a:endParaRPr lang="en-US" sz="2000" b="1">
+            <a:endParaRPr lang="en-US" sz="2000" b="1" dirty="0">
               <a:latin typeface="Courier New"/>
               <a:cs typeface="Courier New"/>
             </a:endParaRPr>
@@ -11009,7 +11358,7 @@
           <a:lstStyle/>
           <a:p>
             <a:r>
-              <a:rPr lang="en-US" b="1" smtClean="0">
+              <a:rPr lang="en-US" b="1" dirty="0" smtClean="0">
                 <a:solidFill>
                   <a:srgbClr val="FF0000"/>
                 </a:solidFill>
@@ -11018,7 +11367,7 @@
               </a:rPr>
               <a:t>command prompt</a:t>
             </a:r>
-            <a:endParaRPr lang="en-US" b="1">
+            <a:endParaRPr lang="en-US" b="1" dirty="0">
               <a:solidFill>
                 <a:srgbClr val="FF0000"/>
               </a:solidFill>
@@ -11237,7 +11586,7 @@
         </p:nvSpPr>
         <p:spPr>
           <a:xfrm>
-            <a:off x="3209984" y="6073209"/>
+            <a:off x="3446346" y="6101641"/>
             <a:ext cx="1149674" cy="369332"/>
           </a:xfrm>
           <a:prstGeom prst="rect">
@@ -11252,7 +11601,7 @@
           <a:lstStyle/>
           <a:p>
             <a:r>
-              <a:rPr lang="en-US" b="1" smtClean="0">
+              <a:rPr lang="en-US" b="1" dirty="0" smtClean="0">
                 <a:solidFill>
                   <a:srgbClr val="008000"/>
                 </a:solidFill>
@@ -11261,7 +11610,7 @@
               </a:rPr>
               <a:t>command</a:t>
             </a:r>
-            <a:endParaRPr lang="en-US" b="1">
+            <a:endParaRPr lang="en-US" b="1" dirty="0">
               <a:solidFill>
                 <a:srgbClr val="008000"/>
               </a:solidFill>
@@ -11279,8 +11628,8 @@
         </p:nvCxnSpPr>
         <p:spPr>
           <a:xfrm flipV="1">
-            <a:off x="3988539" y="5566289"/>
-            <a:ext cx="206414" cy="479241"/>
+            <a:off x="4065395" y="5598830"/>
+            <a:ext cx="50766" cy="462096"/>
           </a:xfrm>
           <a:prstGeom prst="straightConnector1">
             <a:avLst/>
@@ -11335,6 +11684,175 @@
           </a:p>
         </p:txBody>
       </p:sp>
+      <p:sp>
+        <p:nvSpPr>
+          <p:cNvPr id="20" name="TextBox 19"/>
+          <p:cNvSpPr txBox="1"/>
+          <p:nvPr/>
+        </p:nvSpPr>
+        <p:spPr>
+          <a:xfrm>
+            <a:off x="516839" y="6099686"/>
+            <a:ext cx="1317148" cy="369332"/>
+          </a:xfrm>
+          <a:prstGeom prst="rect">
+            <a:avLst/>
+          </a:prstGeom>
+          <a:noFill/>
+        </p:spPr>
+        <p:txBody>
+          <a:bodyPr wrap="square" rtlCol="0">
+            <a:spAutoFit/>
+          </a:bodyPr>
+          <a:lstStyle/>
+          <a:p>
+            <a:r>
+              <a:rPr lang="en-US" b="1" smtClean="0">
+                <a:solidFill>
+                  <a:srgbClr val="FF0000"/>
+                </a:solidFill>
+                <a:latin typeface="Courier New" pitchFamily="49" charset="0"/>
+                <a:cs typeface="Courier New" pitchFamily="49" charset="0"/>
+              </a:rPr>
+              <a:t>username</a:t>
+            </a:r>
+            <a:endParaRPr lang="en-US" b="1" dirty="0">
+              <a:solidFill>
+                <a:srgbClr val="FF0000"/>
+              </a:solidFill>
+              <a:latin typeface="Courier New" pitchFamily="49" charset="0"/>
+              <a:cs typeface="Courier New" pitchFamily="49" charset="0"/>
+            </a:endParaRPr>
+          </a:p>
+        </p:txBody>
+      </p:sp>
+      <p:sp>
+        <p:nvSpPr>
+          <p:cNvPr id="21" name="TextBox 20"/>
+          <p:cNvSpPr txBox="1"/>
+          <p:nvPr/>
+        </p:nvSpPr>
+        <p:spPr>
+          <a:xfrm>
+            <a:off x="2073010" y="6099686"/>
+            <a:ext cx="1624209" cy="584775"/>
+          </a:xfrm>
+          <a:prstGeom prst="rect">
+            <a:avLst/>
+          </a:prstGeom>
+          <a:noFill/>
+        </p:spPr>
+        <p:txBody>
+          <a:bodyPr wrap="square" rtlCol="0">
+            <a:spAutoFit/>
+          </a:bodyPr>
+          <a:lstStyle/>
+          <a:p>
+            <a:r>
+              <a:rPr lang="en-US" b="1" dirty="0" smtClean="0">
+                <a:solidFill>
+                  <a:srgbClr val="FF0000"/>
+                </a:solidFill>
+                <a:latin typeface="Courier New" pitchFamily="49" charset="0"/>
+                <a:cs typeface="Courier New" pitchFamily="49" charset="0"/>
+              </a:rPr>
+              <a:t>Machine</a:t>
+            </a:r>
+            <a:br>
+              <a:rPr lang="en-US" b="1" dirty="0" smtClean="0">
+                <a:solidFill>
+                  <a:srgbClr val="FF0000"/>
+                </a:solidFill>
+                <a:latin typeface="Courier New" pitchFamily="49" charset="0"/>
+                <a:cs typeface="Courier New" pitchFamily="49" charset="0"/>
+              </a:rPr>
+            </a:br>
+            <a:r>
+              <a:rPr lang="en-US" sz="1400" b="1" dirty="0" smtClean="0">
+                <a:solidFill>
+                  <a:srgbClr val="FF0000"/>
+                </a:solidFill>
+                <a:latin typeface="Courier New" pitchFamily="49" charset="0"/>
+                <a:cs typeface="Courier New" pitchFamily="49" charset="0"/>
+              </a:rPr>
+              <a:t>(login node)</a:t>
+            </a:r>
+            <a:endParaRPr lang="en-US" sz="1400" b="1" dirty="0">
+              <a:solidFill>
+                <a:srgbClr val="FF0000"/>
+              </a:solidFill>
+              <a:latin typeface="Courier New" pitchFamily="49" charset="0"/>
+              <a:cs typeface="Courier New" pitchFamily="49" charset="0"/>
+            </a:endParaRPr>
+          </a:p>
+        </p:txBody>
+      </p:sp>
+      <p:cxnSp>
+        <p:nvCxnSpPr>
+          <p:cNvPr id="22" name="Straight Arrow Connector 21"/>
+          <p:cNvCxnSpPr/>
+          <p:nvPr/>
+        </p:nvCxnSpPr>
+        <p:spPr>
+          <a:xfrm flipV="1">
+            <a:off x="1359104" y="5518432"/>
+            <a:ext cx="414875" cy="581255"/>
+          </a:xfrm>
+          <a:prstGeom prst="straightConnector1">
+            <a:avLst/>
+          </a:prstGeom>
+          <a:ln>
+            <a:tailEnd type="arrow"/>
+          </a:ln>
+        </p:spPr>
+        <p:style>
+          <a:lnRef idx="2">
+            <a:schemeClr val="accent1"/>
+          </a:lnRef>
+          <a:fillRef idx="0">
+            <a:schemeClr val="accent1"/>
+          </a:fillRef>
+          <a:effectRef idx="1">
+            <a:schemeClr val="accent1"/>
+          </a:effectRef>
+          <a:fontRef idx="minor">
+            <a:schemeClr val="tx1"/>
+          </a:fontRef>
+        </p:style>
+      </p:cxnSp>
+      <p:cxnSp>
+        <p:nvCxnSpPr>
+          <p:cNvPr id="27" name="Straight Arrow Connector 26"/>
+          <p:cNvCxnSpPr/>
+          <p:nvPr/>
+        </p:nvCxnSpPr>
+        <p:spPr>
+          <a:xfrm flipV="1">
+            <a:off x="2631509" y="5518432"/>
+            <a:ext cx="100076" cy="514898"/>
+          </a:xfrm>
+          <a:prstGeom prst="straightConnector1">
+            <a:avLst/>
+          </a:prstGeom>
+          <a:ln>
+            <a:tailEnd type="arrow"/>
+          </a:ln>
+        </p:spPr>
+        <p:style>
+          <a:lnRef idx="2">
+            <a:schemeClr val="accent1"/>
+          </a:lnRef>
+          <a:fillRef idx="0">
+            <a:schemeClr val="accent1"/>
+          </a:fillRef>
+          <a:effectRef idx="1">
+            <a:schemeClr val="accent1"/>
+          </a:effectRef>
+          <a:fontRef idx="minor">
+            <a:schemeClr val="tx1"/>
+          </a:fontRef>
+        </p:style>
+      </p:cxnSp>
     </p:spTree>
   </p:cSld>
   <p:clrMapOvr>
@@ -11946,7 +12464,7 @@
           <p:nvPr>
             <p:extLst>
               <p:ext uri="{D42A27DB-BD31-4B8C-83A1-F6EECF244321}">
-                <p14:modId xmlns:p14="http://schemas.microsoft.com/office/powerpoint/2010/main" val="4261495577"/>
+                <p14:modId xmlns:p14="http://schemas.microsoft.com/office/powerpoint/2010/main" val="401722842"/>
               </p:ext>
             </p:extLst>
           </p:nvPr>
@@ -12100,7 +12618,19 @@
                           <a:ea typeface="+mn-ea"/>
                           <a:cs typeface="Courier New" pitchFamily="49" charset="0"/>
                         </a:rPr>
-                        <a:t>w hpc22</a:t>
+                        <a:t>w </a:t>
+                      </a:r>
+                      <a:r>
+                        <a:rPr lang="en-AU" sz="1800" b="1" kern="1200" dirty="0" smtClean="0">
+                          <a:solidFill>
+                            <a:schemeClr val="dk1"/>
+                          </a:solidFill>
+                          <a:effectLst/>
+                          <a:latin typeface="Courier New" pitchFamily="49" charset="0"/>
+                          <a:ea typeface="+mn-ea"/>
+                          <a:cs typeface="Courier New" pitchFamily="49" charset="0"/>
+                        </a:rPr>
+                        <a:t>iaa444</a:t>
                       </a:r>
                       <a:endParaRPr lang="en-US" b="1" dirty="0">
                         <a:latin typeface="Courier New" pitchFamily="49" charset="0"/>
@@ -12129,7 +12659,23 @@
                           <a:latin typeface="+mj-lt"/>
                           <a:ea typeface="Calibri"/>
                         </a:rPr>
-                        <a:t>Shows login, idle time, and what user hpc22 is doing </a:t>
+                        <a:t>Shows login, idle time, and what user </a:t>
+                      </a:r>
+                      <a:r>
+                        <a:rPr lang="en-AU" sz="1800" b="0" dirty="0" smtClean="0">
+                          <a:effectLst/>
+                          <a:latin typeface="+mj-lt"/>
+                          <a:ea typeface="Calibri"/>
+                        </a:rPr>
+                        <a:t>iaa444 </a:t>
+                      </a:r>
+                      <a:r>
+                        <a:rPr lang="en-AU" sz="1800" b="0" dirty="0">
+                          <a:effectLst/>
+                          <a:latin typeface="+mj-lt"/>
+                          <a:ea typeface="Calibri"/>
+                        </a:rPr>
+                        <a:t>is doing </a:t>
                       </a:r>
                     </a:p>
                   </a:txBody>
@@ -12199,7 +12745,19 @@
                           <a:ea typeface="+mn-ea"/>
                           <a:cs typeface="Courier New" pitchFamily="49" charset="0"/>
                         </a:rPr>
-                        <a:t>finger hpc22</a:t>
+                        <a:t>finger </a:t>
+                      </a:r>
+                      <a:r>
+                        <a:rPr lang="en-AU" sz="1800" b="1" kern="1200" dirty="0" smtClean="0">
+                          <a:solidFill>
+                            <a:schemeClr val="dk1"/>
+                          </a:solidFill>
+                          <a:effectLst/>
+                          <a:latin typeface="Courier New" pitchFamily="49" charset="0"/>
+                          <a:ea typeface="+mn-ea"/>
+                          <a:cs typeface="Courier New" pitchFamily="49" charset="0"/>
+                        </a:rPr>
+                        <a:t>iaa444</a:t>
                       </a:r>
                       <a:endParaRPr lang="en-US" b="1" dirty="0">
                         <a:latin typeface="Courier New" pitchFamily="49" charset="0"/>
@@ -12224,7 +12782,31 @@
                           <a:ea typeface="+mn-ea"/>
                           <a:cs typeface="+mn-cs"/>
                         </a:rPr>
-                        <a:t>Shows user hpc22’s login details including name, idle time, login time as well as some of their environment settings</a:t>
+                        <a:t>Shows user </a:t>
+                      </a:r>
+                      <a:r>
+                        <a:rPr lang="en-AU" sz="1800" b="0" kern="1200" dirty="0" smtClean="0">
+                          <a:solidFill>
+                            <a:schemeClr val="dk1"/>
+                          </a:solidFill>
+                          <a:effectLst/>
+                          <a:latin typeface="+mj-lt"/>
+                          <a:ea typeface="+mn-ea"/>
+                          <a:cs typeface="+mn-cs"/>
+                        </a:rPr>
+                        <a:t>iaa444’s </a:t>
+                      </a:r>
+                      <a:r>
+                        <a:rPr lang="en-AU" sz="1800" b="0" kern="1200" dirty="0" smtClean="0">
+                          <a:solidFill>
+                            <a:schemeClr val="dk1"/>
+                          </a:solidFill>
+                          <a:effectLst/>
+                          <a:latin typeface="+mj-lt"/>
+                          <a:ea typeface="+mn-ea"/>
+                          <a:cs typeface="+mn-cs"/>
+                        </a:rPr>
+                        <a:t>login details including name, idle time, login time as well as some of their environment settings</a:t>
                       </a:r>
                       <a:endParaRPr lang="en-US" sz="1800" b="0" dirty="0">
                         <a:latin typeface="+mj-lt"/>
@@ -17103,10 +17685,10 @@
             <a:lstStyle/>
             <a:p>
               <a:r>
-                <a:rPr lang="en-US" sz="1200" smtClean="0"/>
+                <a:rPr lang="en-US" sz="1200" dirty="0" smtClean="0"/>
                 <a:t>hpc03</a:t>
               </a:r>
-              <a:endParaRPr lang="en-US" sz="1200"/>
+              <a:endParaRPr lang="en-US" sz="1200" dirty="0"/>
             </a:p>
           </p:txBody>
         </p:sp>
@@ -17172,10 +17754,10 @@
             <a:lstStyle/>
             <a:p>
               <a:r>
-                <a:rPr lang="en-US" sz="1200" smtClean="0"/>
+                <a:rPr lang="en-US" sz="1200" dirty="0" smtClean="0"/>
                 <a:t>hpc21</a:t>
               </a:r>
-              <a:endParaRPr lang="en-US" sz="1200"/>
+              <a:endParaRPr lang="en-US" sz="1200" dirty="0"/>
             </a:p>
           </p:txBody>
         </p:sp>
@@ -19850,14 +20432,14 @@
           <a:lstStyle/>
           <a:p>
             <a:r>
-              <a:rPr lang="en-US" sz="2800" b="1" smtClean="0">
+              <a:rPr lang="en-US" sz="2800" b="1" dirty="0" smtClean="0">
                 <a:latin typeface="Courier New"/>
                 <a:cs typeface="Courier New"/>
               </a:rPr>
               <a:t>/</a:t>
             </a:r>
             <a:r>
-              <a:rPr lang="en-US" sz="2800" b="1" smtClean="0">
+              <a:rPr lang="en-US" sz="2800" b="1" dirty="0" smtClean="0">
                 <a:solidFill>
                   <a:srgbClr val="FF6600"/>
                 </a:solidFill>
@@ -19867,14 +20449,14 @@
               <a:t>home</a:t>
             </a:r>
             <a:r>
-              <a:rPr lang="en-US" sz="2800" b="1" smtClean="0">
+              <a:rPr lang="en-US" sz="2800" b="1" dirty="0" smtClean="0">
                 <a:latin typeface="Courier New"/>
                 <a:cs typeface="Courier New"/>
               </a:rPr>
               <a:t>/</a:t>
             </a:r>
             <a:r>
-              <a:rPr lang="en-US" sz="2800" b="1" smtClean="0">
+              <a:rPr lang="en-US" sz="2800" b="1" dirty="0" smtClean="0">
                 <a:solidFill>
                   <a:srgbClr val="008000"/>
                 </a:solidFill>
@@ -19884,14 +20466,14 @@
               <a:t>hpc02</a:t>
             </a:r>
             <a:r>
-              <a:rPr lang="en-US" sz="2800" b="1" smtClean="0">
+              <a:rPr lang="en-US" sz="2800" b="1" dirty="0" smtClean="0">
                 <a:latin typeface="Courier New"/>
                 <a:cs typeface="Courier New"/>
               </a:rPr>
               <a:t>/</a:t>
             </a:r>
             <a:r>
-              <a:rPr lang="en-US" sz="2800" b="1" smtClean="0">
+              <a:rPr lang="en-US" sz="2800" b="1" dirty="0" err="1" smtClean="0">
                 <a:solidFill>
                   <a:srgbClr val="3366FF"/>
                 </a:solidFill>
@@ -19900,7 +20482,7 @@
               </a:rPr>
               <a:t>regurgitator.sh</a:t>
             </a:r>
-            <a:endParaRPr lang="en-US" sz="2800" b="1">
+            <a:endParaRPr lang="en-US" sz="2800" b="1" dirty="0">
               <a:solidFill>
                 <a:srgbClr val="3366FF"/>
               </a:solidFill>
@@ -20759,23 +21341,28 @@
           <a:lstStyle/>
           <a:p>
             <a:r>
-              <a:rPr lang="en-US" smtClean="0"/>
+              <a:rPr lang="en-US" dirty="0" smtClean="0"/>
               <a:t>There is one root, called “/”</a:t>
             </a:r>
           </a:p>
           <a:p>
             <a:pPr lvl="1"/>
             <a:r>
-              <a:rPr lang="en-US" smtClean="0"/>
-              <a:t>This is different from windows, where there is one root for each disk drive C:, D:, etc</a:t>
-            </a:r>
-          </a:p>
-          <a:p>
-            <a:endParaRPr lang="en-US" smtClean="0"/>
-          </a:p>
-          <a:p>
-            <a:r>
-              <a:rPr lang="en-US" smtClean="0"/>
+              <a:rPr lang="en-US" dirty="0" smtClean="0"/>
+              <a:t>This is different from windows, where there is one root for each disk drive C:, D:, </a:t>
+            </a:r>
+            <a:r>
+              <a:rPr lang="en-US" dirty="0" err="1" smtClean="0"/>
+              <a:t>etc</a:t>
+            </a:r>
+            <a:endParaRPr lang="en-US" dirty="0" smtClean="0"/>
+          </a:p>
+          <a:p>
+            <a:endParaRPr lang="en-US" dirty="0" smtClean="0"/>
+          </a:p>
+          <a:p>
+            <a:r>
+              <a:rPr lang="en-US" dirty="0" smtClean="0"/>
               <a:t>A path from the root designates exactly one file: such a path is called an “absolute path”</a:t>
             </a:r>
           </a:p>
@@ -20783,7 +21370,7 @@
             <a:pPr>
               <a:buNone/>
             </a:pPr>
-            <a:endParaRPr lang="en-US" smtClean="0"/>
+            <a:endParaRPr lang="en-US" dirty="0" smtClean="0"/>
           </a:p>
         </p:txBody>
       </p:sp>
@@ -20889,62 +21476,74 @@
           <a:lstStyle/>
           <a:p>
             <a:r>
-              <a:rPr lang="en-US" sz="2800" smtClean="0"/>
+              <a:rPr lang="en-US" sz="2800" dirty="0" smtClean="0"/>
               <a:t>Each account (user) has a special directory called his/her home directory</a:t>
             </a:r>
           </a:p>
           <a:p>
             <a:pPr lvl="1"/>
             <a:r>
-              <a:rPr lang="en-US" sz="2400" smtClean="0"/>
+              <a:rPr lang="en-US" sz="2400" dirty="0" smtClean="0"/>
               <a:t>That’s where you ‘get put’ when you log in. (More on this later)</a:t>
             </a:r>
           </a:p>
           <a:p>
             <a:r>
-              <a:rPr lang="en-US" sz="2800" smtClean="0"/>
+              <a:rPr lang="en-US" sz="2800" dirty="0" smtClean="0"/>
               <a:t>BASH uses the “~” character to indicate “home directory”</a:t>
             </a:r>
           </a:p>
           <a:p>
             <a:r>
-              <a:rPr lang="en-US" sz="2800" smtClean="0"/>
+              <a:rPr lang="en-US" sz="2800" dirty="0" smtClean="0"/>
               <a:t>Two forms</a:t>
             </a:r>
           </a:p>
           <a:p>
             <a:pPr lvl="1"/>
             <a:r>
-              <a:rPr lang="en-US" sz="2400" b="1" smtClean="0">
+              <a:rPr lang="en-US" sz="2400" b="1" dirty="0" smtClean="0">
                 <a:latin typeface="Courier New"/>
                 <a:cs typeface="Courier New"/>
               </a:rPr>
               <a:t>~</a:t>
             </a:r>
             <a:r>
-              <a:rPr lang="en-US" sz="2400" smtClean="0"/>
+              <a:rPr lang="en-US" sz="2400" dirty="0" smtClean="0"/>
               <a:t> 			“my home directory”</a:t>
             </a:r>
           </a:p>
           <a:p>
             <a:pPr lvl="1"/>
             <a:r>
-              <a:rPr lang="en-US" sz="2400" b="1" smtClean="0">
+              <a:rPr lang="en-US" sz="2400" b="1" dirty="0" smtClean="0">
                 <a:latin typeface="Courier New"/>
                 <a:cs typeface="Courier New"/>
               </a:rPr>
-              <a:t>~hpc01</a:t>
-            </a:r>
-            <a:r>
-              <a:rPr lang="en-US" sz="2400" smtClean="0"/>
-              <a:t> 	“hpc01’s home directory”</a:t>
+              <a:t>~iaa444</a:t>
+            </a:r>
+            <a:r>
+              <a:rPr lang="en-US" sz="2400" dirty="0" smtClean="0"/>
+              <a:t> </a:t>
+            </a:r>
+            <a:r>
+              <a:rPr lang="en-US" sz="2400" dirty="0" smtClean="0"/>
+              <a:t>	</a:t>
+            </a:r>
+            <a:r>
+              <a:rPr lang="en-US" sz="2400" dirty="0" smtClean="0"/>
+              <a:t>“iaa444’s </a:t>
+            </a:r>
+            <a:r>
+              <a:rPr lang="en-US" sz="2400" dirty="0" smtClean="0"/>
+              <a:t>home directory”</a:t>
             </a:r>
           </a:p>
           <a:p>
             <a:pPr>
               <a:buNone/>
             </a:pPr>
-            <a:endParaRPr lang="en-US" sz="2800" smtClean="0"/>
+            <a:endParaRPr lang="en-US" sz="2800" dirty="0" smtClean="0"/>
           </a:p>
         </p:txBody>
       </p:sp>
@@ -27029,7 +27628,15 @@
           <a:p>
             <a:r>
               <a:rPr lang="en-US" dirty="0" smtClean="0"/>
-              <a:t>What is the absolute path of “</a:t>
+              <a:t>What is the </a:t>
+            </a:r>
+            <a:r>
+              <a:rPr lang="en-US" dirty="0" smtClean="0"/>
+              <a:t>relative path </a:t>
+            </a:r>
+            <a:r>
+              <a:rPr lang="en-US" dirty="0" smtClean="0"/>
+              <a:t>of “</a:t>
             </a:r>
             <a:r>
               <a:rPr lang="en-US" b="1" dirty="0" smtClean="0">
@@ -29226,19 +29833,27 @@
           <a:lstStyle/>
           <a:p>
             <a:r>
-              <a:rPr lang="en-US" smtClean="0"/>
-              <a:t>What is the absolute path of </a:t>
-            </a:r>
-          </a:p>
-          <a:p>
-            <a:r>
-              <a:rPr lang="en-US" b="1" smtClean="0">
+              <a:rPr lang="en-US" dirty="0" smtClean="0"/>
+              <a:t>What is the </a:t>
+            </a:r>
+            <a:r>
+              <a:rPr lang="en-US" dirty="0" smtClean="0"/>
+              <a:t>relative path </a:t>
+            </a:r>
+            <a:r>
+              <a:rPr lang="en-US" dirty="0" smtClean="0"/>
+              <a:t>of </a:t>
+            </a:r>
+          </a:p>
+          <a:p>
+            <a:r>
+              <a:rPr lang="en-US" b="1" dirty="0" smtClean="0">
                 <a:latin typeface="Courier New"/>
                 <a:cs typeface="Courier New"/>
               </a:rPr>
               <a:t>../experiment two/step one/file one</a:t>
             </a:r>
-            <a:endParaRPr lang="en-US" b="1">
+            <a:endParaRPr lang="en-US" b="1" dirty="0">
               <a:latin typeface="Courier New"/>
               <a:cs typeface="Courier New"/>
             </a:endParaRPr>
@@ -31136,9 +31751,9 @@
           <p:nvPr/>
         </p:nvCxnSpPr>
         <p:spPr>
-          <a:xfrm rot="16200000" flipV="1">
-            <a:off x="1262991" y="5876181"/>
-            <a:ext cx="555248" cy="361950"/>
+          <a:xfrm flipV="1">
+            <a:off x="1721590" y="5779532"/>
+            <a:ext cx="186114" cy="555248"/>
           </a:xfrm>
           <a:prstGeom prst="straightConnector1">
             <a:avLst/>
@@ -44996,27 +45611,27 @@
                     <a:lstStyle/>
                     <a:p>
                       <a:r>
-                        <a:rPr lang="en-US" sz="1800" b="1" err="1" smtClean="0">
+                        <a:rPr lang="en-US" sz="1800" b="1" dirty="0" err="1" smtClean="0">
                           <a:latin typeface="Courier New"/>
                           <a:cs typeface="Courier New"/>
                         </a:rPr>
                         <a:t>uniq</a:t>
                       </a:r>
                       <a:r>
-                        <a:rPr lang="en-US" sz="1800" b="1" smtClean="0">
+                        <a:rPr lang="en-US" sz="1800" b="1" dirty="0" smtClean="0">
                           <a:latin typeface="Courier New"/>
                           <a:cs typeface="Courier New"/>
                         </a:rPr>
                         <a:t> </a:t>
                       </a:r>
                       <a:r>
-                        <a:rPr lang="en-US" sz="1800" i="1" smtClean="0">
+                        <a:rPr lang="en-US" sz="1800" i="1" dirty="0" smtClean="0">
                           <a:latin typeface="Courier New"/>
                           <a:cs typeface="Courier New"/>
                         </a:rPr>
                         <a:t>&lt;file&gt; </a:t>
                       </a:r>
-                      <a:endParaRPr lang="en-US"/>
+                      <a:endParaRPr lang="en-US" dirty="0"/>
                     </a:p>
                   </a:txBody>
                   <a:tcPr/>
@@ -47295,16 +47910,25 @@
               <a:t>Host: </a:t>
             </a:r>
             <a:r>
-              <a:rPr lang="en-US" sz="2200" b="1" dirty="0" smtClean="0">
+              <a:rPr lang="en-US" sz="2200" dirty="0"/>
+              <a:t> </a:t>
+            </a:r>
+            <a:r>
+              <a:rPr lang="en-US" sz="2200" dirty="0" smtClean="0"/>
+              <a:t>   </a:t>
+            </a:r>
+            <a:r>
+              <a:rPr lang="en-US" sz="2200" b="1" dirty="0" err="1" smtClean="0">
                 <a:latin typeface="Courier New" pitchFamily="49" charset="0"/>
                 <a:cs typeface="Courier New" pitchFamily="49" charset="0"/>
               </a:rPr>
-              <a:t>octane.intersect.org.au</a:t>
+              <a:t>raijin.nci.org.au</a:t>
             </a:r>
             <a:r>
               <a:rPr lang="en-US" sz="2200" dirty="0" smtClean="0"/>
               <a:t> </a:t>
             </a:r>
+            <a:endParaRPr lang="en-US" sz="2200" dirty="0" smtClean="0"/>
           </a:p>
           <a:p>
             <a:pPr lvl="1"/>
@@ -47378,15 +48002,15 @@
             <a:noFill/>
           </a:ln>
           <a:extLst>
-            <a:ext uri="{909E8E84-426E-40DD-AFC4-6F175D3DCCD1}">
-              <a14:hiddenFill xmlns:a14="http://schemas.microsoft.com/office/drawing/2010/main">
+            <a:ext uri="{909E8E84-426E-40dd-AFC4-6F175D3DCCD1}">
+              <a14:hiddenFill xmlns:a14="http://schemas.microsoft.com/office/drawing/2010/main" xmlns="">
                 <a:solidFill>
                   <a:schemeClr val="accent1"/>
                 </a:solidFill>
               </a14:hiddenFill>
             </a:ext>
-            <a:ext uri="{91240B29-F687-4F45-9708-019B960494DF}">
-              <a14:hiddenLine xmlns:a14="http://schemas.microsoft.com/office/drawing/2010/main" w="9525">
+            <a:ext uri="{91240B29-F687-4f45-9708-019B960494DF}">
+              <a14:hiddenLine xmlns:a14="http://schemas.microsoft.com/office/drawing/2010/main" xmlns="" w="9525">
                 <a:solidFill>
                   <a:schemeClr val="tx1"/>
                 </a:solidFill>
@@ -47426,6 +48050,82 @@
               <a:t>8</a:t>
             </a:fld>
             <a:endParaRPr lang="en-AU" dirty="0"/>
+          </a:p>
+        </p:txBody>
+      </p:sp>
+      <p:sp>
+        <p:nvSpPr>
+          <p:cNvPr id="6" name="TextBox 5"/>
+          <p:cNvSpPr txBox="1"/>
+          <p:nvPr/>
+        </p:nvSpPr>
+        <p:spPr>
+          <a:xfrm>
+            <a:off x="3851920" y="5440529"/>
+            <a:ext cx="1407241" cy="276999"/>
+          </a:xfrm>
+          <a:prstGeom prst="rect">
+            <a:avLst/>
+          </a:prstGeom>
+          <a:solidFill>
+            <a:srgbClr val="FFFF00"/>
+          </a:solidFill>
+        </p:spPr>
+        <p:txBody>
+          <a:bodyPr wrap="square" rtlCol="0">
+            <a:spAutoFit/>
+          </a:bodyPr>
+          <a:lstStyle/>
+          <a:p>
+            <a:r>
+              <a:rPr lang="en-US" sz="1200" smtClean="0"/>
+              <a:t>raijin.nci.org.au</a:t>
+            </a:r>
+            <a:endParaRPr lang="en-US" sz="1200" dirty="0" smtClean="0"/>
+          </a:p>
+        </p:txBody>
+      </p:sp>
+      <p:sp>
+        <p:nvSpPr>
+          <p:cNvPr id="7" name="Notched Right Arrow 6"/>
+          <p:cNvSpPr/>
+          <p:nvPr/>
+        </p:nvSpPr>
+        <p:spPr>
+          <a:xfrm>
+            <a:off x="3923928" y="3861048"/>
+            <a:ext cx="1944216" cy="1008112"/>
+          </a:xfrm>
+          <a:prstGeom prst="notchedRightArrow">
+            <a:avLst/>
+          </a:prstGeom>
+          <a:scene3d>
+            <a:camera prst="orthographicFront">
+              <a:rot lat="0" lon="0" rev="16200000"/>
+            </a:camera>
+            <a:lightRig rig="threePt" dir="t"/>
+          </a:scene3d>
+        </p:spPr>
+        <p:style>
+          <a:lnRef idx="1">
+            <a:schemeClr val="accent1"/>
+          </a:lnRef>
+          <a:fillRef idx="3">
+            <a:schemeClr val="accent1"/>
+          </a:fillRef>
+          <a:effectRef idx="2">
+            <a:schemeClr val="accent1"/>
+          </a:effectRef>
+          <a:fontRef idx="minor">
+            <a:schemeClr val="lt1"/>
+          </a:fontRef>
+        </p:style>
+        <p:txBody>
+          <a:bodyPr rtlCol="0" anchor="ctr"/>
+          <a:lstStyle/>
+          <a:p>
+            <a:pPr algn="ctr"/>
+            <a:endParaRPr lang="en-US"/>
           </a:p>
         </p:txBody>
       </p:sp>
@@ -48180,10 +48880,14 @@
           <a:lstStyle/>
           <a:p>
             <a:r>
-              <a:rPr lang="en-US" smtClean="0"/>
-              <a:t>Log On to the HPC Machine</a:t>
-            </a:r>
-            <a:endParaRPr lang="en-US"/>
+              <a:rPr lang="en-US" dirty="0" smtClean="0"/>
+              <a:t>Log On to </a:t>
+            </a:r>
+            <a:r>
+              <a:rPr lang="en-US" dirty="0" smtClean="0"/>
+              <a:t>Raijin</a:t>
+            </a:r>
+            <a:endParaRPr lang="en-US" dirty="0"/>
           </a:p>
         </p:txBody>
       </p:sp>
@@ -48208,92 +48912,272 @@
           <a:lstStyle/>
           <a:p>
             <a:r>
-              <a:rPr lang="en-US" smtClean="0"/>
-              <a:t>Log into the training HPC system using the Test Account allocated to you, e.g.</a:t>
+              <a:rPr lang="en-US" dirty="0" smtClean="0"/>
+              <a:t>Log into </a:t>
+            </a:r>
+            <a:r>
+              <a:rPr lang="en-US" dirty="0" smtClean="0"/>
+              <a:t>Raijin using </a:t>
+            </a:r>
+            <a:r>
+              <a:rPr lang="en-US" dirty="0" smtClean="0"/>
+              <a:t>the Test Account allocated to you, e.g.</a:t>
             </a:r>
           </a:p>
           <a:p>
             <a:pPr lvl="2"/>
             <a:r>
-              <a:rPr lang="en-US" b="1" smtClean="0"/>
+              <a:rPr lang="en-US" b="1" dirty="0" smtClean="0"/>
               <a:t>Account Name: </a:t>
             </a:r>
             <a:r>
-              <a:rPr lang="en-US" smtClean="0"/>
-              <a:t>hpc26</a:t>
-            </a:r>
+              <a:rPr lang="en-US" dirty="0" smtClean="0">
+                <a:solidFill>
+                  <a:schemeClr val="accent2">
+                    <a:lumMod val="75000"/>
+                  </a:schemeClr>
+                </a:solidFill>
+              </a:rPr>
+              <a:t>iaa444 </a:t>
+            </a:r>
+            <a:r>
+              <a:rPr lang="en-US" dirty="0" smtClean="0">
+                <a:solidFill>
+                  <a:schemeClr val="accent2">
+                    <a:lumMod val="75000"/>
+                  </a:schemeClr>
+                </a:solidFill>
+              </a:rPr>
+              <a:t>– </a:t>
+            </a:r>
+            <a:r>
+              <a:rPr lang="en-US" dirty="0" smtClean="0">
+                <a:solidFill>
+                  <a:schemeClr val="accent2">
+                    <a:lumMod val="75000"/>
+                  </a:schemeClr>
+                </a:solidFill>
+              </a:rPr>
+              <a:t>i</a:t>
+            </a:r>
+            <a:r>
+              <a:rPr lang="en-US" dirty="0" smtClean="0">
+                <a:solidFill>
+                  <a:schemeClr val="accent2">
+                    <a:lumMod val="75000"/>
+                  </a:schemeClr>
+                </a:solidFill>
+              </a:rPr>
+              <a:t>bx444</a:t>
+            </a:r>
+          </a:p>
+          <a:p>
+            <a:pPr lvl="3"/>
+            <a:r>
+              <a:rPr lang="en-US" dirty="0" err="1">
+                <a:solidFill>
+                  <a:schemeClr val="accent2">
+                    <a:lumMod val="75000"/>
+                  </a:schemeClr>
+                </a:solidFill>
+              </a:rPr>
+              <a:t>i</a:t>
+            </a:r>
+            <a:r>
+              <a:rPr lang="en-US" dirty="0" err="1" smtClean="0">
+                <a:solidFill>
+                  <a:schemeClr val="accent2">
+                    <a:lumMod val="75000"/>
+                  </a:schemeClr>
+                </a:solidFill>
+              </a:rPr>
+              <a:t>aa</a:t>
+            </a:r>
+            <a:r>
+              <a:rPr lang="en-US" dirty="0" smtClean="0">
+                <a:solidFill>
+                  <a:schemeClr val="accent2">
+                    <a:lumMod val="75000"/>
+                  </a:schemeClr>
+                </a:solidFill>
+              </a:rPr>
+              <a:t>, </a:t>
+            </a:r>
+            <a:r>
+              <a:rPr lang="en-US" dirty="0" err="1" smtClean="0">
+                <a:solidFill>
+                  <a:schemeClr val="accent2">
+                    <a:lumMod val="75000"/>
+                  </a:schemeClr>
+                </a:solidFill>
+              </a:rPr>
+              <a:t>iab</a:t>
+            </a:r>
+            <a:r>
+              <a:rPr lang="en-US" dirty="0" smtClean="0">
+                <a:solidFill>
+                  <a:schemeClr val="accent2">
+                    <a:lumMod val="75000"/>
+                  </a:schemeClr>
+                </a:solidFill>
+              </a:rPr>
+              <a:t>, </a:t>
+            </a:r>
+            <a:r>
+              <a:rPr lang="en-US" dirty="0" err="1" smtClean="0">
+                <a:solidFill>
+                  <a:schemeClr val="accent2">
+                    <a:lumMod val="75000"/>
+                  </a:schemeClr>
+                </a:solidFill>
+              </a:rPr>
+              <a:t>iac</a:t>
+            </a:r>
+            <a:r>
+              <a:rPr lang="mr-IN" dirty="0" smtClean="0">
+                <a:solidFill>
+                  <a:schemeClr val="accent2">
+                    <a:lumMod val="75000"/>
+                  </a:schemeClr>
+                </a:solidFill>
+              </a:rPr>
+              <a:t>…</a:t>
+            </a:r>
+            <a:r>
+              <a:rPr lang="en-AU" dirty="0" smtClean="0">
+                <a:solidFill>
+                  <a:schemeClr val="accent2">
+                    <a:lumMod val="75000"/>
+                  </a:schemeClr>
+                </a:solidFill>
+              </a:rPr>
+              <a:t> </a:t>
+            </a:r>
+            <a:r>
+              <a:rPr lang="en-AU" dirty="0" err="1" smtClean="0">
+                <a:solidFill>
+                  <a:schemeClr val="accent2">
+                    <a:lumMod val="75000"/>
+                  </a:schemeClr>
+                </a:solidFill>
+              </a:rPr>
+              <a:t>iax</a:t>
+            </a:r>
+            <a:r>
+              <a:rPr lang="en-AU" dirty="0" smtClean="0">
+                <a:solidFill>
+                  <a:schemeClr val="accent2">
+                    <a:lumMod val="75000"/>
+                  </a:schemeClr>
+                </a:solidFill>
+              </a:rPr>
+              <a:t>, </a:t>
+            </a:r>
+            <a:r>
+              <a:rPr lang="en-AU" dirty="0" err="1" smtClean="0">
+                <a:solidFill>
+                  <a:schemeClr val="accent2">
+                    <a:lumMod val="75000"/>
+                  </a:schemeClr>
+                </a:solidFill>
+              </a:rPr>
+              <a:t>iba</a:t>
+            </a:r>
+            <a:r>
+              <a:rPr lang="en-AU" dirty="0" smtClean="0">
+                <a:solidFill>
+                  <a:schemeClr val="accent2">
+                    <a:lumMod val="75000"/>
+                  </a:schemeClr>
+                </a:solidFill>
+              </a:rPr>
+              <a:t>, </a:t>
+            </a:r>
+            <a:r>
+              <a:rPr lang="en-AU" dirty="0" err="1" smtClean="0">
+                <a:solidFill>
+                  <a:schemeClr val="accent2">
+                    <a:lumMod val="75000"/>
+                  </a:schemeClr>
+                </a:solidFill>
+              </a:rPr>
+              <a:t>ibb</a:t>
+            </a:r>
+            <a:r>
+              <a:rPr lang="en-AU" dirty="0" smtClean="0">
+                <a:solidFill>
+                  <a:schemeClr val="accent2">
+                    <a:lumMod val="75000"/>
+                  </a:schemeClr>
+                </a:solidFill>
+              </a:rPr>
+              <a:t>, </a:t>
+            </a:r>
+            <a:r>
+              <a:rPr lang="en-AU" dirty="0" err="1" smtClean="0">
+                <a:solidFill>
+                  <a:schemeClr val="accent2">
+                    <a:lumMod val="75000"/>
+                  </a:schemeClr>
+                </a:solidFill>
+              </a:rPr>
+              <a:t>ibc</a:t>
+            </a:r>
+            <a:r>
+              <a:rPr lang="en-AU" dirty="0" smtClean="0">
+                <a:solidFill>
+                  <a:schemeClr val="accent2">
+                    <a:lumMod val="75000"/>
+                  </a:schemeClr>
+                </a:solidFill>
+              </a:rPr>
+              <a:t> </a:t>
+            </a:r>
+            <a:r>
+              <a:rPr lang="mr-IN" dirty="0" smtClean="0">
+                <a:solidFill>
+                  <a:schemeClr val="accent2">
+                    <a:lumMod val="75000"/>
+                  </a:schemeClr>
+                </a:solidFill>
+              </a:rPr>
+              <a:t>…</a:t>
+            </a:r>
+            <a:r>
+              <a:rPr lang="en-AU" dirty="0" err="1" smtClean="0">
+                <a:solidFill>
+                  <a:schemeClr val="accent2">
+                    <a:lumMod val="75000"/>
+                  </a:schemeClr>
+                </a:solidFill>
+              </a:rPr>
+              <a:t>ibx</a:t>
+            </a:r>
+            <a:endParaRPr lang="en-US" dirty="0" smtClean="0">
+              <a:solidFill>
+                <a:schemeClr val="accent2">
+                  <a:lumMod val="75000"/>
+                </a:schemeClr>
+              </a:solidFill>
+            </a:endParaRPr>
           </a:p>
           <a:p>
             <a:pPr lvl="2"/>
             <a:r>
-              <a:rPr lang="en-US" b="1" smtClean="0"/>
+              <a:rPr lang="en-US" b="1" dirty="0" smtClean="0"/>
               <a:t>Password: </a:t>
             </a:r>
             <a:r>
-              <a:rPr lang="en-US" smtClean="0"/>
-              <a:t>train26</a:t>
+              <a:rPr lang="en-US" dirty="0" smtClean="0"/>
+              <a:t>provided by your instructor</a:t>
             </a:r>
           </a:p>
           <a:p>
             <a:pPr lvl="2"/>
-            <a:endParaRPr lang="en-US" smtClean="0"/>
-          </a:p>
-        </p:txBody>
-      </p:sp>
-      <p:pic>
-        <p:nvPicPr>
-          <p:cNvPr id="2050" name="Picture 2"/>
-          <p:cNvPicPr>
-            <a:picLocks noChangeAspect="1" noChangeArrowheads="1"/>
-          </p:cNvPicPr>
-          <p:nvPr/>
-        </p:nvPicPr>
-        <p:blipFill>
-          <a:blip r:embed="rId3">
-            <a:extLst>
-              <a:ext uri="{28A0092B-C50C-407E-A947-70E740481C1C}">
-                <a14:useLocalDpi xmlns:a14="http://schemas.microsoft.com/office/drawing/2010/main" val="0"/>
-              </a:ext>
-            </a:extLst>
-          </a:blip>
-          <a:srcRect/>
-          <a:stretch>
-            <a:fillRect/>
-          </a:stretch>
-        </p:blipFill>
-        <p:spPr bwMode="auto">
-          <a:xfrm>
-            <a:off x="1543050" y="3501008"/>
-            <a:ext cx="6057900" cy="2714625"/>
-          </a:xfrm>
-          <a:prstGeom prst="rect">
-            <a:avLst/>
-          </a:prstGeom>
-          <a:noFill/>
-          <a:ln>
-            <a:noFill/>
-          </a:ln>
-          <a:extLst>
-            <a:ext uri="{909E8E84-426E-40DD-AFC4-6F175D3DCCD1}">
-              <a14:hiddenFill xmlns:a14="http://schemas.microsoft.com/office/drawing/2010/main">
-                <a:solidFill>
-                  <a:schemeClr val="accent1"/>
-                </a:solidFill>
-              </a14:hiddenFill>
-            </a:ext>
-            <a:ext uri="{91240B29-F687-4F45-9708-019B960494DF}">
-              <a14:hiddenLine xmlns:a14="http://schemas.microsoft.com/office/drawing/2010/main" w="9525">
-                <a:solidFill>
-                  <a:schemeClr val="tx1"/>
-                </a:solidFill>
-                <a:miter lim="800000"/>
-                <a:headEnd/>
-                <a:tailEnd/>
-              </a14:hiddenLine>
-            </a:ext>
-          </a:extLst>
-        </p:spPr>
-      </p:pic>
+            <a:endParaRPr lang="en-US" dirty="0" smtClean="0"/>
+          </a:p>
+        </p:txBody>
+      </p:sp>
       <p:sp>
         <p:nvSpPr>
           <p:cNvPr id="5" name="Slide Number Placeholder 4"/>

</xml_diff>